<commit_message>
Added documentation and presentation
</commit_message>
<xml_diff>
--- a/DB/JudgeSystem/Основна-презентация.pptx
+++ b/DB/JudgeSystem/Основна-презентация.pptx
@@ -8,24 +8,21 @@
     <p:sldId id="256" r:id="rId2"/>
     <p:sldId id="262" r:id="rId3"/>
     <p:sldId id="260" r:id="rId4"/>
-    <p:sldId id="257" r:id="rId5"/>
-    <p:sldId id="258" r:id="rId6"/>
-    <p:sldId id="259" r:id="rId7"/>
-    <p:sldId id="261" r:id="rId8"/>
-    <p:sldId id="266" r:id="rId9"/>
-    <p:sldId id="267" r:id="rId10"/>
-    <p:sldId id="268" r:id="rId11"/>
-    <p:sldId id="269" r:id="rId12"/>
-    <p:sldId id="270" r:id="rId13"/>
-    <p:sldId id="271" r:id="rId14"/>
-    <p:sldId id="272" r:id="rId15"/>
-    <p:sldId id="273" r:id="rId16"/>
-    <p:sldId id="274" r:id="rId17"/>
-    <p:sldId id="276" r:id="rId18"/>
-    <p:sldId id="275" r:id="rId19"/>
-    <p:sldId id="263" r:id="rId20"/>
-    <p:sldId id="264" r:id="rId21"/>
-    <p:sldId id="265" r:id="rId22"/>
+    <p:sldId id="258" r:id="rId5"/>
+    <p:sldId id="266" r:id="rId6"/>
+    <p:sldId id="267" r:id="rId7"/>
+    <p:sldId id="268" r:id="rId8"/>
+    <p:sldId id="269" r:id="rId9"/>
+    <p:sldId id="270" r:id="rId10"/>
+    <p:sldId id="271" r:id="rId11"/>
+    <p:sldId id="272" r:id="rId12"/>
+    <p:sldId id="273" r:id="rId13"/>
+    <p:sldId id="274" r:id="rId14"/>
+    <p:sldId id="276" r:id="rId15"/>
+    <p:sldId id="275" r:id="rId16"/>
+    <p:sldId id="263" r:id="rId17"/>
+    <p:sldId id="264" r:id="rId18"/>
+    <p:sldId id="265" r:id="rId19"/>
   </p:sldIdLst>
   <p:sldSz cx="12192000" cy="6858000"/>
   <p:notesSz cx="6858000" cy="9144000"/>
@@ -147,7 +144,7 @@
 <file path=ppt/revisionInfo.xml><?xml version="1.0" encoding="utf-8"?>
 <p1510:revInfo xmlns:a="http://schemas.openxmlformats.org/drawingml/2006/main" xmlns:r="http://schemas.openxmlformats.org/officeDocument/2006/relationships" xmlns:p1510="http://schemas.microsoft.com/office/powerpoint/2015/10/main">
   <p1510:revLst>
-    <p1510:client id="{14C7DD34-F43A-4AED-8691-25B097AC4DD6}" v="385" dt="2022-05-17T19:41:52.019"/>
+    <p1510:client id="{FC1B5B34-E97C-7215-1EBE-7ECDF594B9DE}" v="3" dt="2022-05-18T14:15:59.872"/>
   </p1510:revLst>
 </p1510:revInfo>
 </file>
@@ -3130,1327 +3127,6 @@
           <p:cNvPr id="2" name="Title 1">
             <a:extLst>
               <a:ext uri="{FF2B5EF4-FFF2-40B4-BE49-F238E27FC236}">
-                <a16:creationId xmlns:a16="http://schemas.microsoft.com/office/drawing/2014/main" id="{88AF85A5-FE9C-A3BA-D307-322170E8369D}"/>
-              </a:ext>
-            </a:extLst>
-          </p:cNvPr>
-          <p:cNvSpPr>
-            <a:spLocks noGrp="1"/>
-          </p:cNvSpPr>
-          <p:nvPr>
-            <p:ph type="title"/>
-          </p:nvPr>
-        </p:nvSpPr>
-        <p:spPr/>
-        <p:txBody>
-          <a:bodyPr/>
-          <a:lstStyle/>
-          <a:p>
-            <a:r>
-              <a:rPr lang="en-US" b="1" i="1" dirty="0" err="1">
-                <a:cs typeface="Calibri Light"/>
-              </a:rPr>
-              <a:t>Прости</a:t>
-            </a:r>
-            <a:r>
-              <a:rPr lang="en-US" b="1" i="1" dirty="0">
-                <a:cs typeface="Calibri Light"/>
-              </a:rPr>
-              <a:t> </a:t>
-            </a:r>
-            <a:r>
-              <a:rPr lang="en-US" b="1" i="1" dirty="0" err="1">
-                <a:cs typeface="Calibri Light"/>
-              </a:rPr>
-              <a:t>заявки</a:t>
-            </a:r>
-            <a:endParaRPr lang="en-US" b="1" i="1" dirty="0" err="1"/>
-          </a:p>
-        </p:txBody>
-      </p:sp>
-      <p:sp>
-        <p:nvSpPr>
-          <p:cNvPr id="7" name="Текстово поле 6">
-            <a:extLst>
-              <a:ext uri="{FF2B5EF4-FFF2-40B4-BE49-F238E27FC236}">
-                <a16:creationId xmlns:a16="http://schemas.microsoft.com/office/drawing/2014/main" id="{AF9A2533-D927-849D-DEE3-B9EF90E1D87D}"/>
-              </a:ext>
-            </a:extLst>
-          </p:cNvPr>
-          <p:cNvSpPr txBox="1"/>
-          <p:nvPr/>
-        </p:nvSpPr>
-        <p:spPr>
-          <a:xfrm>
-            <a:off x="838200" y="1590020"/>
-            <a:ext cx="8380603" cy="4401205"/>
-          </a:xfrm>
-          <a:prstGeom prst="rect">
-            <a:avLst/>
-          </a:prstGeom>
-          <a:noFill/>
-        </p:spPr>
-        <p:txBody>
-          <a:bodyPr wrap="square" rtlCol="0">
-            <a:spAutoFit/>
-          </a:bodyPr>
-          <a:lstStyle/>
-          <a:p>
-            <a:r>
-              <a:rPr lang="en-US" sz="4000" dirty="0">
-                <a:solidFill>
-                  <a:srgbClr val="FF0000"/>
-                </a:solidFill>
-                <a:latin typeface="Algerian" panose="04020705040A02060702" pitchFamily="82" charset="0"/>
-              </a:rPr>
-              <a:t>SELECT</a:t>
-            </a:r>
-            <a:r>
-              <a:rPr lang="en-US" sz="4000" dirty="0">
-                <a:latin typeface="Algerian" panose="04020705040A02060702" pitchFamily="82" charset="0"/>
-              </a:rPr>
-              <a:t> *</a:t>
-            </a:r>
-          </a:p>
-          <a:p>
-            <a:r>
-              <a:rPr lang="en-US" sz="4000" dirty="0">
-                <a:solidFill>
-                  <a:srgbClr val="FF0000"/>
-                </a:solidFill>
-                <a:latin typeface="Algerian" panose="04020705040A02060702" pitchFamily="82" charset="0"/>
-              </a:rPr>
-              <a:t>FROM</a:t>
-            </a:r>
-            <a:r>
-              <a:rPr lang="en-US" sz="4000" dirty="0">
-                <a:latin typeface="Algerian" panose="04020705040A02060702" pitchFamily="82" charset="0"/>
-              </a:rPr>
-              <a:t> Tests</a:t>
-            </a:r>
-          </a:p>
-          <a:p>
-            <a:r>
-              <a:rPr lang="en-US" sz="4000" dirty="0">
-                <a:solidFill>
-                  <a:srgbClr val="FF0000"/>
-                </a:solidFill>
-                <a:latin typeface="Algerian" panose="04020705040A02060702" pitchFamily="82" charset="0"/>
-              </a:rPr>
-              <a:t>WHERE</a:t>
-            </a:r>
-            <a:r>
-              <a:rPr lang="en-US" sz="4000" dirty="0">
-                <a:latin typeface="Algerian" panose="04020705040A02060702" pitchFamily="82" charset="0"/>
-              </a:rPr>
-              <a:t> </a:t>
-            </a:r>
-            <a:r>
-              <a:rPr lang="en-US" sz="4000" dirty="0" err="1">
-                <a:latin typeface="Algerian" panose="04020705040A02060702" pitchFamily="82" charset="0"/>
-              </a:rPr>
-              <a:t>ProblemId</a:t>
-            </a:r>
-            <a:r>
-              <a:rPr lang="en-US" sz="4000" dirty="0">
-                <a:latin typeface="Algerian" panose="04020705040A02060702" pitchFamily="82" charset="0"/>
-              </a:rPr>
-              <a:t> = 1;</a:t>
-            </a:r>
-          </a:p>
-          <a:p>
-            <a:r>
-              <a:rPr lang="en-US" sz="4000" dirty="0">
-                <a:solidFill>
-                  <a:srgbClr val="FF0000"/>
-                </a:solidFill>
-                <a:latin typeface="Algerian" panose="04020705040A02060702" pitchFamily="82" charset="0"/>
-              </a:rPr>
-              <a:t>SELECT</a:t>
-            </a:r>
-            <a:r>
-              <a:rPr lang="en-US" sz="4000" dirty="0">
-                <a:latin typeface="Algerian" panose="04020705040A02060702" pitchFamily="82" charset="0"/>
-              </a:rPr>
-              <a:t> * </a:t>
-            </a:r>
-          </a:p>
-          <a:p>
-            <a:r>
-              <a:rPr lang="en-US" sz="4000" dirty="0">
-                <a:solidFill>
-                  <a:srgbClr val="FF0000"/>
-                </a:solidFill>
-                <a:latin typeface="Algerian" panose="04020705040A02060702" pitchFamily="82" charset="0"/>
-              </a:rPr>
-              <a:t>FROM</a:t>
-            </a:r>
-            <a:r>
-              <a:rPr lang="en-US" sz="4000" dirty="0">
-                <a:latin typeface="Algerian" panose="04020705040A02060702" pitchFamily="82" charset="0"/>
-              </a:rPr>
-              <a:t> Contests</a:t>
-            </a:r>
-          </a:p>
-          <a:p>
-            <a:r>
-              <a:rPr lang="en-US" sz="4000" dirty="0">
-                <a:solidFill>
-                  <a:srgbClr val="FF0000"/>
-                </a:solidFill>
-                <a:latin typeface="Algerian" panose="04020705040A02060702" pitchFamily="82" charset="0"/>
-              </a:rPr>
-              <a:t>WHERE</a:t>
-            </a:r>
-            <a:r>
-              <a:rPr lang="en-US" sz="4000" dirty="0">
-                <a:latin typeface="Algerian" panose="04020705040A02060702" pitchFamily="82" charset="0"/>
-              </a:rPr>
-              <a:t> GETDATE</a:t>
-            </a:r>
-            <a:r>
-              <a:rPr lang="en-US" sz="4000" dirty="0">
-                <a:solidFill>
-                  <a:srgbClr val="FFC000"/>
-                </a:solidFill>
-                <a:latin typeface="Algerian" panose="04020705040A02060702" pitchFamily="82" charset="0"/>
-              </a:rPr>
-              <a:t>()</a:t>
-            </a:r>
-            <a:r>
-              <a:rPr lang="en-US" sz="4000" dirty="0">
-                <a:latin typeface="Algerian" panose="04020705040A02060702" pitchFamily="82" charset="0"/>
-              </a:rPr>
-              <a:t> </a:t>
-            </a:r>
-            <a:r>
-              <a:rPr lang="en-US" sz="4000" dirty="0">
-                <a:solidFill>
-                  <a:srgbClr val="FF0000"/>
-                </a:solidFill>
-                <a:latin typeface="Algerian" panose="04020705040A02060702" pitchFamily="82" charset="0"/>
-              </a:rPr>
-              <a:t>BETWEEN</a:t>
-            </a:r>
-            <a:r>
-              <a:rPr lang="en-US" sz="4000" dirty="0">
-                <a:latin typeface="Algerian" panose="04020705040A02060702" pitchFamily="82" charset="0"/>
-              </a:rPr>
-              <a:t> </a:t>
-            </a:r>
-            <a:r>
-              <a:rPr lang="en-US" sz="4000" dirty="0" err="1">
-                <a:latin typeface="Algerian" panose="04020705040A02060702" pitchFamily="82" charset="0"/>
-              </a:rPr>
-              <a:t>StartTime</a:t>
-            </a:r>
-            <a:r>
-              <a:rPr lang="en-US" sz="4000" dirty="0">
-                <a:latin typeface="Algerian" panose="04020705040A02060702" pitchFamily="82" charset="0"/>
-              </a:rPr>
-              <a:t> </a:t>
-            </a:r>
-            <a:r>
-              <a:rPr lang="en-US" sz="4000" dirty="0">
-                <a:solidFill>
-                  <a:srgbClr val="FF0000"/>
-                </a:solidFill>
-                <a:latin typeface="Algerian" panose="04020705040A02060702" pitchFamily="82" charset="0"/>
-              </a:rPr>
-              <a:t>AND</a:t>
-            </a:r>
-            <a:r>
-              <a:rPr lang="en-US" sz="4000" dirty="0">
-                <a:latin typeface="Algerian" panose="04020705040A02060702" pitchFamily="82" charset="0"/>
-              </a:rPr>
-              <a:t> </a:t>
-            </a:r>
-            <a:r>
-              <a:rPr lang="en-US" sz="4000" dirty="0" err="1">
-                <a:latin typeface="Algerian" panose="04020705040A02060702" pitchFamily="82" charset="0"/>
-              </a:rPr>
-              <a:t>EndTime</a:t>
-            </a:r>
-            <a:r>
-              <a:rPr lang="en-US" sz="4000" dirty="0">
-                <a:latin typeface="Algerian" panose="04020705040A02060702" pitchFamily="82" charset="0"/>
-              </a:rPr>
-              <a:t>;</a:t>
-            </a:r>
-          </a:p>
-        </p:txBody>
-      </p:sp>
-    </p:spTree>
-    <p:extLst>
-      <p:ext uri="{BB962C8B-B14F-4D97-AF65-F5344CB8AC3E}">
-        <p14:creationId xmlns:p14="http://schemas.microsoft.com/office/powerpoint/2010/main" val="1209971532"/>
-      </p:ext>
-    </p:extLst>
-  </p:cSld>
-  <p:clrMapOvr>
-    <a:masterClrMapping/>
-  </p:clrMapOvr>
-</p:sld>
-</file>
-
-<file path=ppt/slides/slide11.xml><?xml version="1.0" encoding="utf-8"?>
-<p:sld xmlns:a="http://schemas.openxmlformats.org/drawingml/2006/main" xmlns:r="http://schemas.openxmlformats.org/officeDocument/2006/relationships" xmlns:p="http://schemas.openxmlformats.org/presentationml/2006/main">
-  <p:cSld>
-    <p:spTree>
-      <p:nvGrpSpPr>
-        <p:cNvPr id="1" name=""/>
-        <p:cNvGrpSpPr/>
-        <p:nvPr/>
-      </p:nvGrpSpPr>
-      <p:grpSpPr>
-        <a:xfrm>
-          <a:off x="0" y="0"/>
-          <a:ext cx="0" cy="0"/>
-          <a:chOff x="0" y="0"/>
-          <a:chExt cx="0" cy="0"/>
-        </a:xfrm>
-      </p:grpSpPr>
-      <p:sp>
-        <p:nvSpPr>
-          <p:cNvPr id="2" name="Title 1">
-            <a:extLst>
-              <a:ext uri="{FF2B5EF4-FFF2-40B4-BE49-F238E27FC236}">
-                <a16:creationId xmlns:a16="http://schemas.microsoft.com/office/drawing/2014/main" id="{77D6D8B1-8147-CB5F-37E1-36470B474523}"/>
-              </a:ext>
-            </a:extLst>
-          </p:cNvPr>
-          <p:cNvSpPr>
-            <a:spLocks noGrp="1"/>
-          </p:cNvSpPr>
-          <p:nvPr>
-            <p:ph type="title"/>
-          </p:nvPr>
-        </p:nvSpPr>
-        <p:spPr/>
-        <p:txBody>
-          <a:bodyPr/>
-          <a:lstStyle/>
-          <a:p>
-            <a:r>
-              <a:rPr lang="en-US" b="1" i="1" dirty="0" err="1">
-                <a:cs typeface="Calibri Light"/>
-              </a:rPr>
-              <a:t>Заявки</a:t>
-            </a:r>
-            <a:r>
-              <a:rPr lang="en-US" b="1" i="1" dirty="0">
-                <a:cs typeface="Calibri Light"/>
-              </a:rPr>
-              <a:t> </a:t>
-            </a:r>
-            <a:r>
-              <a:rPr lang="en-US" b="1" i="1" dirty="0" err="1">
-                <a:cs typeface="Calibri Light"/>
-              </a:rPr>
-              <a:t>върху</a:t>
-            </a:r>
-            <a:r>
-              <a:rPr lang="en-US" b="1" i="1" dirty="0">
-                <a:cs typeface="Calibri Light"/>
-              </a:rPr>
-              <a:t> 2 и </a:t>
-            </a:r>
-            <a:r>
-              <a:rPr lang="en-US" b="1" i="1" dirty="0" err="1">
-                <a:cs typeface="Calibri Light"/>
-              </a:rPr>
-              <a:t>повече</a:t>
-            </a:r>
-            <a:r>
-              <a:rPr lang="en-US" b="1" i="1" dirty="0">
-                <a:cs typeface="Calibri Light"/>
-              </a:rPr>
-              <a:t> </a:t>
-            </a:r>
-            <a:r>
-              <a:rPr lang="en-US" b="1" i="1" dirty="0" err="1">
-                <a:cs typeface="Calibri Light"/>
-              </a:rPr>
-              <a:t>релации</a:t>
-            </a:r>
-            <a:endParaRPr lang="en-US" b="1" i="1" dirty="0" err="1"/>
-          </a:p>
-        </p:txBody>
-      </p:sp>
-      <p:sp>
-        <p:nvSpPr>
-          <p:cNvPr id="4" name="Текстово поле 3">
-            <a:extLst>
-              <a:ext uri="{FF2B5EF4-FFF2-40B4-BE49-F238E27FC236}">
-                <a16:creationId xmlns:a16="http://schemas.microsoft.com/office/drawing/2014/main" id="{F81F64DD-F479-73DF-7C7B-E26952DD5FE0}"/>
-              </a:ext>
-            </a:extLst>
-          </p:cNvPr>
-          <p:cNvSpPr txBox="1"/>
-          <p:nvPr/>
-        </p:nvSpPr>
-        <p:spPr>
-          <a:xfrm>
-            <a:off x="265651" y="2178283"/>
-            <a:ext cx="11660697" cy="2308324"/>
-          </a:xfrm>
-          <a:prstGeom prst="rect">
-            <a:avLst/>
-          </a:prstGeom>
-          <a:noFill/>
-        </p:spPr>
-        <p:txBody>
-          <a:bodyPr wrap="square" rtlCol="0">
-            <a:spAutoFit/>
-          </a:bodyPr>
-          <a:lstStyle/>
-          <a:p>
-            <a:r>
-              <a:rPr lang="en-US" dirty="0">
-                <a:solidFill>
-                  <a:srgbClr val="FF0000"/>
-                </a:solidFill>
-                <a:latin typeface="Algerian" panose="04020705040A02060702" pitchFamily="82" charset="0"/>
-              </a:rPr>
-              <a:t>SELECT</a:t>
-            </a:r>
-            <a:r>
-              <a:rPr lang="en-US" dirty="0">
-                <a:latin typeface="Algerian" panose="04020705040A02060702" pitchFamily="82" charset="0"/>
-              </a:rPr>
-              <a:t> </a:t>
-            </a:r>
-            <a:r>
-              <a:rPr lang="en-US" dirty="0" err="1">
-                <a:latin typeface="Algerian" panose="04020705040A02060702" pitchFamily="82" charset="0"/>
-              </a:rPr>
-              <a:t>Problems.Name</a:t>
-            </a:r>
-            <a:r>
-              <a:rPr lang="en-US" dirty="0">
-                <a:latin typeface="Algerian" panose="04020705040A02060702" pitchFamily="82" charset="0"/>
-              </a:rPr>
-              <a:t> as </a:t>
-            </a:r>
-            <a:r>
-              <a:rPr lang="en-US" dirty="0">
-                <a:solidFill>
-                  <a:srgbClr val="FFC000"/>
-                </a:solidFill>
-                <a:latin typeface="Algerian" panose="04020705040A02060702" pitchFamily="82" charset="0"/>
-              </a:rPr>
-              <a:t>[Problem Name]</a:t>
-            </a:r>
-            <a:r>
-              <a:rPr lang="en-US" dirty="0">
-                <a:latin typeface="Algerian" panose="04020705040A02060702" pitchFamily="82" charset="0"/>
-              </a:rPr>
-              <a:t>, </a:t>
-            </a:r>
-            <a:r>
-              <a:rPr lang="en-US" dirty="0" err="1">
-                <a:latin typeface="Algerian" panose="04020705040A02060702" pitchFamily="82" charset="0"/>
-              </a:rPr>
-              <a:t>Tests.Id</a:t>
-            </a:r>
-            <a:r>
-              <a:rPr lang="en-US" dirty="0">
-                <a:latin typeface="Algerian" panose="04020705040A02060702" pitchFamily="82" charset="0"/>
-              </a:rPr>
-              <a:t> </a:t>
-            </a:r>
-            <a:r>
-              <a:rPr lang="en-US" dirty="0">
-                <a:solidFill>
-                  <a:srgbClr val="FF0000"/>
-                </a:solidFill>
-                <a:latin typeface="Algerian" panose="04020705040A02060702" pitchFamily="82" charset="0"/>
-              </a:rPr>
-              <a:t>AS</a:t>
-            </a:r>
-            <a:r>
-              <a:rPr lang="en-US" dirty="0">
-                <a:latin typeface="Algerian" panose="04020705040A02060702" pitchFamily="82" charset="0"/>
-              </a:rPr>
-              <a:t> </a:t>
-            </a:r>
-            <a:r>
-              <a:rPr lang="en-US" dirty="0">
-                <a:solidFill>
-                  <a:srgbClr val="FFC000"/>
-                </a:solidFill>
-                <a:latin typeface="Algerian" panose="04020705040A02060702" pitchFamily="82" charset="0"/>
-              </a:rPr>
-              <a:t>[Test ID]</a:t>
-            </a:r>
-            <a:r>
-              <a:rPr lang="en-US" dirty="0">
-                <a:latin typeface="Algerian" panose="04020705040A02060702" pitchFamily="82" charset="0"/>
-              </a:rPr>
-              <a:t>, </a:t>
-            </a:r>
-            <a:r>
-              <a:rPr lang="en-US" dirty="0" err="1">
-                <a:latin typeface="Algerian" panose="04020705040A02060702" pitchFamily="82" charset="0"/>
-              </a:rPr>
-              <a:t>ExecutedTests.Output</a:t>
-            </a:r>
-            <a:r>
-              <a:rPr lang="en-US" dirty="0">
-                <a:latin typeface="Algerian" panose="04020705040A02060702" pitchFamily="82" charset="0"/>
-              </a:rPr>
-              <a:t>, </a:t>
-            </a:r>
-            <a:r>
-              <a:rPr lang="en-US" dirty="0" err="1">
-                <a:latin typeface="Algerian" panose="04020705040A02060702" pitchFamily="82" charset="0"/>
-              </a:rPr>
-              <a:t>Tests.ExpectedOutput</a:t>
-            </a:r>
-            <a:r>
-              <a:rPr lang="en-US" dirty="0">
-                <a:latin typeface="Algerian" panose="04020705040A02060702" pitchFamily="82" charset="0"/>
-              </a:rPr>
-              <a:t>, </a:t>
-            </a:r>
-            <a:r>
-              <a:rPr lang="en-US" dirty="0">
-                <a:solidFill>
-                  <a:srgbClr val="FF0000"/>
-                </a:solidFill>
-                <a:latin typeface="Algerian" panose="04020705040A02060702" pitchFamily="82" charset="0"/>
-              </a:rPr>
-              <a:t>CASE</a:t>
-            </a:r>
-            <a:r>
-              <a:rPr lang="en-US" dirty="0">
-                <a:latin typeface="Algerian" panose="04020705040A02060702" pitchFamily="82" charset="0"/>
-              </a:rPr>
-              <a:t> </a:t>
-            </a:r>
-          </a:p>
-          <a:p>
-            <a:r>
-              <a:rPr lang="en-US" dirty="0">
-                <a:latin typeface="Algerian" panose="04020705040A02060702" pitchFamily="82" charset="0"/>
-              </a:rPr>
-              <a:t>	</a:t>
-            </a:r>
-            <a:r>
-              <a:rPr lang="en-US" dirty="0">
-                <a:solidFill>
-                  <a:srgbClr val="FF0000"/>
-                </a:solidFill>
-                <a:latin typeface="Algerian" panose="04020705040A02060702" pitchFamily="82" charset="0"/>
-              </a:rPr>
-              <a:t>WHEN</a:t>
-            </a:r>
-            <a:r>
-              <a:rPr lang="en-US" dirty="0">
-                <a:latin typeface="Algerian" panose="04020705040A02060702" pitchFamily="82" charset="0"/>
-              </a:rPr>
-              <a:t> </a:t>
-            </a:r>
-            <a:r>
-              <a:rPr lang="en-US" dirty="0" err="1">
-                <a:latin typeface="Algerian" panose="04020705040A02060702" pitchFamily="82" charset="0"/>
-              </a:rPr>
-              <a:t>ExecutedTests.Output</a:t>
-            </a:r>
-            <a:r>
-              <a:rPr lang="en-US" dirty="0">
-                <a:latin typeface="Algerian" panose="04020705040A02060702" pitchFamily="82" charset="0"/>
-              </a:rPr>
-              <a:t> = </a:t>
-            </a:r>
-            <a:r>
-              <a:rPr lang="en-US" dirty="0" err="1">
-                <a:latin typeface="Algerian" panose="04020705040A02060702" pitchFamily="82" charset="0"/>
-              </a:rPr>
-              <a:t>Tests.ExpectedOutput</a:t>
-            </a:r>
-            <a:endParaRPr lang="en-US" dirty="0">
-              <a:latin typeface="Algerian" panose="04020705040A02060702" pitchFamily="82" charset="0"/>
-            </a:endParaRPr>
-          </a:p>
-          <a:p>
-            <a:r>
-              <a:rPr lang="en-US" dirty="0">
-                <a:latin typeface="Algerian" panose="04020705040A02060702" pitchFamily="82" charset="0"/>
-              </a:rPr>
-              <a:t>		</a:t>
-            </a:r>
-            <a:r>
-              <a:rPr lang="en-US" dirty="0">
-                <a:solidFill>
-                  <a:srgbClr val="FF0000"/>
-                </a:solidFill>
-                <a:latin typeface="Algerian" panose="04020705040A02060702" pitchFamily="82" charset="0"/>
-              </a:rPr>
-              <a:t>THEN</a:t>
-            </a:r>
-            <a:r>
-              <a:rPr lang="en-US" dirty="0">
-                <a:latin typeface="Algerian" panose="04020705040A02060702" pitchFamily="82" charset="0"/>
-              </a:rPr>
-              <a:t> 'Yes'</a:t>
-            </a:r>
-          </a:p>
-          <a:p>
-            <a:r>
-              <a:rPr lang="en-US" dirty="0">
-                <a:latin typeface="Algerian" panose="04020705040A02060702" pitchFamily="82" charset="0"/>
-              </a:rPr>
-              <a:t>		</a:t>
-            </a:r>
-            <a:r>
-              <a:rPr lang="en-US" dirty="0">
-                <a:solidFill>
-                  <a:srgbClr val="FF0000"/>
-                </a:solidFill>
-                <a:latin typeface="Algerian" panose="04020705040A02060702" pitchFamily="82" charset="0"/>
-              </a:rPr>
-              <a:t>ELSE</a:t>
-            </a:r>
-            <a:r>
-              <a:rPr lang="en-US" dirty="0">
-                <a:latin typeface="Algerian" panose="04020705040A02060702" pitchFamily="82" charset="0"/>
-              </a:rPr>
-              <a:t> 'No'</a:t>
-            </a:r>
-          </a:p>
-          <a:p>
-            <a:r>
-              <a:rPr lang="en-US" dirty="0">
-                <a:latin typeface="Algerian" panose="04020705040A02060702" pitchFamily="82" charset="0"/>
-              </a:rPr>
-              <a:t>	</a:t>
-            </a:r>
-            <a:r>
-              <a:rPr lang="en-US" dirty="0">
-                <a:solidFill>
-                  <a:srgbClr val="FF0000"/>
-                </a:solidFill>
-                <a:latin typeface="Algerian" panose="04020705040A02060702" pitchFamily="82" charset="0"/>
-              </a:rPr>
-              <a:t>END</a:t>
-            </a:r>
-            <a:r>
-              <a:rPr lang="en-US" dirty="0">
-                <a:latin typeface="Algerian" panose="04020705040A02060702" pitchFamily="82" charset="0"/>
-              </a:rPr>
-              <a:t> </a:t>
-            </a:r>
-            <a:r>
-              <a:rPr lang="en-US" dirty="0">
-                <a:solidFill>
-                  <a:srgbClr val="FF0000"/>
-                </a:solidFill>
-                <a:latin typeface="Algerian" panose="04020705040A02060702" pitchFamily="82" charset="0"/>
-              </a:rPr>
-              <a:t>AS</a:t>
-            </a:r>
-            <a:r>
-              <a:rPr lang="en-US" dirty="0">
-                <a:latin typeface="Algerian" panose="04020705040A02060702" pitchFamily="82" charset="0"/>
-              </a:rPr>
-              <a:t> [Correct Output] </a:t>
-            </a:r>
-          </a:p>
-          <a:p>
-            <a:r>
-              <a:rPr lang="en-US" dirty="0">
-                <a:solidFill>
-                  <a:srgbClr val="FF0000"/>
-                </a:solidFill>
-                <a:latin typeface="Algerian" panose="04020705040A02060702" pitchFamily="82" charset="0"/>
-              </a:rPr>
-              <a:t>FROM</a:t>
-            </a:r>
-            <a:r>
-              <a:rPr lang="en-US" dirty="0">
-                <a:latin typeface="Algerian" panose="04020705040A02060702" pitchFamily="82" charset="0"/>
-              </a:rPr>
-              <a:t> Tests, </a:t>
-            </a:r>
-            <a:r>
-              <a:rPr lang="en-US" dirty="0" err="1">
-                <a:latin typeface="Algerian" panose="04020705040A02060702" pitchFamily="82" charset="0"/>
-              </a:rPr>
-              <a:t>ExecutedTests</a:t>
-            </a:r>
-            <a:r>
-              <a:rPr lang="en-US" dirty="0">
-                <a:latin typeface="Algerian" panose="04020705040A02060702" pitchFamily="82" charset="0"/>
-              </a:rPr>
-              <a:t>, Problems</a:t>
-            </a:r>
-          </a:p>
-          <a:p>
-            <a:r>
-              <a:rPr lang="en-US" dirty="0">
-                <a:solidFill>
-                  <a:srgbClr val="FF0000"/>
-                </a:solidFill>
-                <a:latin typeface="Algerian" panose="04020705040A02060702" pitchFamily="82" charset="0"/>
-              </a:rPr>
-              <a:t>WHERE</a:t>
-            </a:r>
-            <a:r>
-              <a:rPr lang="en-US" dirty="0">
-                <a:latin typeface="Algerian" panose="04020705040A02060702" pitchFamily="82" charset="0"/>
-              </a:rPr>
-              <a:t> </a:t>
-            </a:r>
-            <a:r>
-              <a:rPr lang="en-US" dirty="0" err="1">
-                <a:latin typeface="Algerian" panose="04020705040A02060702" pitchFamily="82" charset="0"/>
-              </a:rPr>
-              <a:t>Tests.Id</a:t>
-            </a:r>
-            <a:r>
-              <a:rPr lang="en-US" dirty="0">
-                <a:latin typeface="Algerian" panose="04020705040A02060702" pitchFamily="82" charset="0"/>
-              </a:rPr>
-              <a:t> = </a:t>
-            </a:r>
-            <a:r>
-              <a:rPr lang="en-US" dirty="0" err="1">
-                <a:latin typeface="Algerian" panose="04020705040A02060702" pitchFamily="82" charset="0"/>
-              </a:rPr>
-              <a:t>ExecutedTests.TestId</a:t>
-            </a:r>
-            <a:r>
-              <a:rPr lang="en-US" dirty="0">
-                <a:latin typeface="Algerian" panose="04020705040A02060702" pitchFamily="82" charset="0"/>
-              </a:rPr>
-              <a:t> </a:t>
-            </a:r>
-            <a:r>
-              <a:rPr lang="en-US" dirty="0">
-                <a:solidFill>
-                  <a:srgbClr val="FF0000"/>
-                </a:solidFill>
-                <a:latin typeface="Algerian" panose="04020705040A02060702" pitchFamily="82" charset="0"/>
-              </a:rPr>
-              <a:t>AND</a:t>
-            </a:r>
-            <a:r>
-              <a:rPr lang="en-US" dirty="0">
-                <a:latin typeface="Algerian" panose="04020705040A02060702" pitchFamily="82" charset="0"/>
-              </a:rPr>
-              <a:t> </a:t>
-            </a:r>
-            <a:r>
-              <a:rPr lang="en-US" dirty="0" err="1">
-                <a:latin typeface="Algerian" panose="04020705040A02060702" pitchFamily="82" charset="0"/>
-              </a:rPr>
-              <a:t>Tests.ProblemId</a:t>
-            </a:r>
-            <a:r>
-              <a:rPr lang="en-US" dirty="0">
-                <a:latin typeface="Algerian" panose="04020705040A02060702" pitchFamily="82" charset="0"/>
-              </a:rPr>
-              <a:t> = </a:t>
-            </a:r>
-            <a:r>
-              <a:rPr lang="en-US" dirty="0" err="1">
-                <a:latin typeface="Algerian" panose="04020705040A02060702" pitchFamily="82" charset="0"/>
-              </a:rPr>
-              <a:t>Problems.Id</a:t>
-            </a:r>
-            <a:r>
-              <a:rPr lang="en-US" dirty="0">
-                <a:latin typeface="Algerian" panose="04020705040A02060702" pitchFamily="82" charset="0"/>
-              </a:rPr>
-              <a:t> </a:t>
-            </a:r>
-            <a:r>
-              <a:rPr lang="en-US" dirty="0">
-                <a:solidFill>
-                  <a:srgbClr val="FF0000"/>
-                </a:solidFill>
-                <a:latin typeface="Algerian" panose="04020705040A02060702" pitchFamily="82" charset="0"/>
-              </a:rPr>
-              <a:t>AND</a:t>
-            </a:r>
-            <a:r>
-              <a:rPr lang="en-US" dirty="0">
-                <a:latin typeface="Algerian" panose="04020705040A02060702" pitchFamily="82" charset="0"/>
-              </a:rPr>
-              <a:t> </a:t>
-            </a:r>
-            <a:r>
-              <a:rPr lang="en-US" dirty="0" err="1">
-                <a:latin typeface="Algerian" panose="04020705040A02060702" pitchFamily="82" charset="0"/>
-              </a:rPr>
-              <a:t>Problems.Id</a:t>
-            </a:r>
-            <a:r>
-              <a:rPr lang="en-US" dirty="0">
-                <a:latin typeface="Algerian" panose="04020705040A02060702" pitchFamily="82" charset="0"/>
-              </a:rPr>
-              <a:t> = </a:t>
-            </a:r>
-            <a:r>
-              <a:rPr lang="en-US" dirty="0">
-                <a:solidFill>
-                  <a:srgbClr val="0070C0"/>
-                </a:solidFill>
-                <a:latin typeface="Algerian" panose="04020705040A02060702" pitchFamily="82" charset="0"/>
-              </a:rPr>
-              <a:t>1</a:t>
-            </a:r>
-          </a:p>
-        </p:txBody>
-      </p:sp>
-    </p:spTree>
-    <p:extLst>
-      <p:ext uri="{BB962C8B-B14F-4D97-AF65-F5344CB8AC3E}">
-        <p14:creationId xmlns:p14="http://schemas.microsoft.com/office/powerpoint/2010/main" val="3640873684"/>
-      </p:ext>
-    </p:extLst>
-  </p:cSld>
-  <p:clrMapOvr>
-    <a:masterClrMapping/>
-  </p:clrMapOvr>
-</p:sld>
-</file>
-
-<file path=ppt/slides/slide12.xml><?xml version="1.0" encoding="utf-8"?>
-<p:sld xmlns:a="http://schemas.openxmlformats.org/drawingml/2006/main" xmlns:r="http://schemas.openxmlformats.org/officeDocument/2006/relationships" xmlns:p="http://schemas.openxmlformats.org/presentationml/2006/main">
-  <p:cSld>
-    <p:spTree>
-      <p:nvGrpSpPr>
-        <p:cNvPr id="1" name=""/>
-        <p:cNvGrpSpPr/>
-        <p:nvPr/>
-      </p:nvGrpSpPr>
-      <p:grpSpPr>
-        <a:xfrm>
-          <a:off x="0" y="0"/>
-          <a:ext cx="0" cy="0"/>
-          <a:chOff x="0" y="0"/>
-          <a:chExt cx="0" cy="0"/>
-        </a:xfrm>
-      </p:grpSpPr>
-      <p:sp>
-        <p:nvSpPr>
-          <p:cNvPr id="2" name="Title 1">
-            <a:extLst>
-              <a:ext uri="{FF2B5EF4-FFF2-40B4-BE49-F238E27FC236}">
-                <a16:creationId xmlns:a16="http://schemas.microsoft.com/office/drawing/2014/main" id="{79EF2D8F-08FF-2470-629E-1ECBFC695342}"/>
-              </a:ext>
-            </a:extLst>
-          </p:cNvPr>
-          <p:cNvSpPr>
-            <a:spLocks noGrp="1"/>
-          </p:cNvSpPr>
-          <p:nvPr>
-            <p:ph type="title"/>
-          </p:nvPr>
-        </p:nvSpPr>
-        <p:spPr/>
-        <p:txBody>
-          <a:bodyPr/>
-          <a:lstStyle/>
-          <a:p>
-            <a:r>
-              <a:rPr lang="en-US" b="1" i="1" dirty="0" err="1">
-                <a:cs typeface="Calibri Light"/>
-              </a:rPr>
-              <a:t>Подзаявки</a:t>
-            </a:r>
-            <a:endParaRPr lang="en-US" b="1" i="1" dirty="0" err="1"/>
-          </a:p>
-        </p:txBody>
-      </p:sp>
-      <p:sp>
-        <p:nvSpPr>
-          <p:cNvPr id="4" name="Текстово поле 3">
-            <a:extLst>
-              <a:ext uri="{FF2B5EF4-FFF2-40B4-BE49-F238E27FC236}">
-                <a16:creationId xmlns:a16="http://schemas.microsoft.com/office/drawing/2014/main" id="{77185441-23CF-86C8-F0DA-2C050EE6156F}"/>
-              </a:ext>
-            </a:extLst>
-          </p:cNvPr>
-          <p:cNvSpPr txBox="1"/>
-          <p:nvPr/>
-        </p:nvSpPr>
-        <p:spPr>
-          <a:xfrm>
-            <a:off x="343948" y="2305615"/>
-            <a:ext cx="12407317" cy="2246769"/>
-          </a:xfrm>
-          <a:prstGeom prst="rect">
-            <a:avLst/>
-          </a:prstGeom>
-          <a:noFill/>
-        </p:spPr>
-        <p:txBody>
-          <a:bodyPr wrap="square" rtlCol="0">
-            <a:spAutoFit/>
-          </a:bodyPr>
-          <a:lstStyle/>
-          <a:p>
-            <a:r>
-              <a:rPr lang="en-US" sz="2000" dirty="0">
-                <a:solidFill>
-                  <a:srgbClr val="FF0000"/>
-                </a:solidFill>
-                <a:latin typeface="Algerian" panose="04020705040A02060702" pitchFamily="82" charset="0"/>
-              </a:rPr>
-              <a:t>SELECT</a:t>
-            </a:r>
-            <a:r>
-              <a:rPr lang="en-US" sz="2000" dirty="0">
-                <a:latin typeface="Algerian" panose="04020705040A02060702" pitchFamily="82" charset="0"/>
-              </a:rPr>
-              <a:t> </a:t>
-            </a:r>
-            <a:r>
-              <a:rPr lang="en-US" sz="2000" dirty="0" err="1">
-                <a:latin typeface="Algerian" panose="04020705040A02060702" pitchFamily="82" charset="0"/>
-              </a:rPr>
-              <a:t>max_s.ProblemId</a:t>
-            </a:r>
-            <a:r>
-              <a:rPr lang="en-US" sz="2000" dirty="0">
-                <a:latin typeface="Algerian" panose="04020705040A02060702" pitchFamily="82" charset="0"/>
-              </a:rPr>
-              <a:t>, </a:t>
-            </a:r>
-            <a:r>
-              <a:rPr lang="en-US" sz="2000" dirty="0" err="1">
-                <a:latin typeface="Algerian" panose="04020705040A02060702" pitchFamily="82" charset="0"/>
-              </a:rPr>
-              <a:t>Submissions.Id</a:t>
-            </a:r>
-            <a:r>
-              <a:rPr lang="en-US" sz="2000" dirty="0">
-                <a:latin typeface="Algerian" panose="04020705040A02060702" pitchFamily="82" charset="0"/>
-              </a:rPr>
-              <a:t>, </a:t>
-            </a:r>
-            <a:r>
-              <a:rPr lang="en-US" sz="2000" dirty="0" err="1">
-                <a:latin typeface="Algerian" panose="04020705040A02060702" pitchFamily="82" charset="0"/>
-              </a:rPr>
-              <a:t>max_s</a:t>
-            </a:r>
-            <a:r>
-              <a:rPr lang="en-US" sz="2000" dirty="0">
-                <a:latin typeface="Algerian" panose="04020705040A02060702" pitchFamily="82" charset="0"/>
-              </a:rPr>
-              <a:t>.</a:t>
-            </a:r>
-            <a:r>
-              <a:rPr lang="en-US" sz="2000" dirty="0">
-                <a:solidFill>
-                  <a:schemeClr val="accent4"/>
-                </a:solidFill>
-                <a:latin typeface="Algerian" panose="04020705040A02060702" pitchFamily="82" charset="0"/>
-              </a:rPr>
-              <a:t>[</a:t>
-            </a:r>
-            <a:r>
-              <a:rPr lang="en-US" sz="2000" dirty="0">
-                <a:latin typeface="Algerian" panose="04020705040A02060702" pitchFamily="82" charset="0"/>
-              </a:rPr>
-              <a:t>Max Points</a:t>
-            </a:r>
-            <a:r>
-              <a:rPr lang="en-US" sz="2000" dirty="0">
-                <a:solidFill>
-                  <a:schemeClr val="accent4"/>
-                </a:solidFill>
-                <a:latin typeface="Algerian" panose="04020705040A02060702" pitchFamily="82" charset="0"/>
-              </a:rPr>
-              <a:t>]</a:t>
-            </a:r>
-            <a:r>
-              <a:rPr lang="en-US" sz="2000" dirty="0">
-                <a:latin typeface="Algerian" panose="04020705040A02060702" pitchFamily="82" charset="0"/>
-              </a:rPr>
-              <a:t> </a:t>
-            </a:r>
-          </a:p>
-          <a:p>
-            <a:r>
-              <a:rPr lang="en-US" sz="2000" dirty="0">
-                <a:solidFill>
-                  <a:srgbClr val="FF0000"/>
-                </a:solidFill>
-                <a:latin typeface="Algerian" panose="04020705040A02060702" pitchFamily="82" charset="0"/>
-              </a:rPr>
-              <a:t>FROM</a:t>
-            </a:r>
-            <a:r>
-              <a:rPr lang="en-US" sz="2000" dirty="0">
-                <a:latin typeface="Algerian" panose="04020705040A02060702" pitchFamily="82" charset="0"/>
-              </a:rPr>
-              <a:t> Submissions, </a:t>
-            </a:r>
-            <a:r>
-              <a:rPr lang="en-US" sz="2000" dirty="0">
-                <a:solidFill>
-                  <a:schemeClr val="accent4"/>
-                </a:solidFill>
-                <a:latin typeface="Algerian" panose="04020705040A02060702" pitchFamily="82" charset="0"/>
-              </a:rPr>
-              <a:t>(</a:t>
-            </a:r>
-          </a:p>
-          <a:p>
-            <a:r>
-              <a:rPr lang="en-US" sz="2000" dirty="0">
-                <a:latin typeface="Algerian" panose="04020705040A02060702" pitchFamily="82" charset="0"/>
-              </a:rPr>
-              <a:t>	</a:t>
-            </a:r>
-            <a:r>
-              <a:rPr lang="en-US" sz="2000" dirty="0">
-                <a:solidFill>
-                  <a:srgbClr val="FF0000"/>
-                </a:solidFill>
-                <a:latin typeface="Algerian" panose="04020705040A02060702" pitchFamily="82" charset="0"/>
-              </a:rPr>
-              <a:t>SELECT</a:t>
-            </a:r>
-            <a:r>
-              <a:rPr lang="en-US" sz="2000" dirty="0">
-                <a:latin typeface="Algerian" panose="04020705040A02060702" pitchFamily="82" charset="0"/>
-              </a:rPr>
-              <a:t> </a:t>
-            </a:r>
-            <a:r>
-              <a:rPr lang="en-US" sz="2000" dirty="0" err="1">
-                <a:latin typeface="Algerian" panose="04020705040A02060702" pitchFamily="82" charset="0"/>
-              </a:rPr>
-              <a:t>Submissions.ProblemId</a:t>
-            </a:r>
-            <a:r>
-              <a:rPr lang="en-US" sz="2000" dirty="0">
-                <a:latin typeface="Algerian" panose="04020705040A02060702" pitchFamily="82" charset="0"/>
-              </a:rPr>
-              <a:t>, </a:t>
-            </a:r>
-            <a:r>
-              <a:rPr lang="en-US" sz="2000" dirty="0">
-                <a:solidFill>
-                  <a:srgbClr val="0070C0"/>
-                </a:solidFill>
-                <a:latin typeface="Algerian" panose="04020705040A02060702" pitchFamily="82" charset="0"/>
-              </a:rPr>
-              <a:t>MAX</a:t>
-            </a:r>
-            <a:r>
-              <a:rPr lang="en-US" sz="2000" dirty="0">
-                <a:latin typeface="Algerian" panose="04020705040A02060702" pitchFamily="82" charset="0"/>
-              </a:rPr>
-              <a:t>(</a:t>
-            </a:r>
-            <a:r>
-              <a:rPr lang="en-US" sz="2000" dirty="0" err="1">
-                <a:latin typeface="Algerian" panose="04020705040A02060702" pitchFamily="82" charset="0"/>
-              </a:rPr>
-              <a:t>Submissions.ActualPoints</a:t>
-            </a:r>
-            <a:r>
-              <a:rPr lang="en-US" sz="2000" dirty="0">
-                <a:latin typeface="Algerian" panose="04020705040A02060702" pitchFamily="82" charset="0"/>
-              </a:rPr>
-              <a:t>) </a:t>
-            </a:r>
-            <a:r>
-              <a:rPr lang="en-US" sz="2000" dirty="0">
-                <a:solidFill>
-                  <a:srgbClr val="FF0000"/>
-                </a:solidFill>
-                <a:latin typeface="Algerian" panose="04020705040A02060702" pitchFamily="82" charset="0"/>
-              </a:rPr>
-              <a:t>AS</a:t>
-            </a:r>
-            <a:r>
-              <a:rPr lang="en-US" sz="2000" dirty="0">
-                <a:latin typeface="Algerian" panose="04020705040A02060702" pitchFamily="82" charset="0"/>
-              </a:rPr>
-              <a:t> </a:t>
-            </a:r>
-            <a:r>
-              <a:rPr lang="en-US" sz="2000" dirty="0">
-                <a:solidFill>
-                  <a:schemeClr val="accent4"/>
-                </a:solidFill>
-                <a:latin typeface="Algerian" panose="04020705040A02060702" pitchFamily="82" charset="0"/>
-              </a:rPr>
-              <a:t>[</a:t>
-            </a:r>
-            <a:r>
-              <a:rPr lang="en-US" sz="2000" dirty="0">
-                <a:latin typeface="Algerian" panose="04020705040A02060702" pitchFamily="82" charset="0"/>
-              </a:rPr>
-              <a:t>Max Points</a:t>
-            </a:r>
-            <a:r>
-              <a:rPr lang="en-US" sz="2000" dirty="0">
-                <a:solidFill>
-                  <a:schemeClr val="accent4"/>
-                </a:solidFill>
-                <a:latin typeface="Algerian" panose="04020705040A02060702" pitchFamily="82" charset="0"/>
-              </a:rPr>
-              <a:t>]</a:t>
-            </a:r>
-          </a:p>
-          <a:p>
-            <a:r>
-              <a:rPr lang="en-US" sz="2000" dirty="0">
-                <a:latin typeface="Algerian" panose="04020705040A02060702" pitchFamily="82" charset="0"/>
-              </a:rPr>
-              <a:t>	</a:t>
-            </a:r>
-            <a:r>
-              <a:rPr lang="en-US" sz="2000" dirty="0">
-                <a:solidFill>
-                  <a:srgbClr val="FF0000"/>
-                </a:solidFill>
-                <a:latin typeface="Algerian" panose="04020705040A02060702" pitchFamily="82" charset="0"/>
-              </a:rPr>
-              <a:t>FROM</a:t>
-            </a:r>
-            <a:r>
-              <a:rPr lang="en-US" sz="2000" dirty="0">
-                <a:latin typeface="Algerian" panose="04020705040A02060702" pitchFamily="82" charset="0"/>
-              </a:rPr>
-              <a:t> Submissions</a:t>
-            </a:r>
-          </a:p>
-          <a:p>
-            <a:r>
-              <a:rPr lang="en-US" sz="2000" dirty="0">
-                <a:latin typeface="Algerian" panose="04020705040A02060702" pitchFamily="82" charset="0"/>
-              </a:rPr>
-              <a:t>	</a:t>
-            </a:r>
-            <a:r>
-              <a:rPr lang="en-US" sz="2000" dirty="0">
-                <a:solidFill>
-                  <a:srgbClr val="FF0000"/>
-                </a:solidFill>
-                <a:latin typeface="Algerian" panose="04020705040A02060702" pitchFamily="82" charset="0"/>
-              </a:rPr>
-              <a:t>GROUP BY </a:t>
-            </a:r>
-            <a:r>
-              <a:rPr lang="en-US" sz="2000" dirty="0" err="1">
-                <a:latin typeface="Algerian" panose="04020705040A02060702" pitchFamily="82" charset="0"/>
-              </a:rPr>
-              <a:t>Submissions.ProblemId</a:t>
-            </a:r>
-            <a:r>
-              <a:rPr lang="en-US" sz="2000" dirty="0">
-                <a:solidFill>
-                  <a:schemeClr val="accent4"/>
-                </a:solidFill>
-                <a:latin typeface="Algerian" panose="04020705040A02060702" pitchFamily="82" charset="0"/>
-              </a:rPr>
-              <a:t>)</a:t>
-            </a:r>
-            <a:r>
-              <a:rPr lang="en-US" sz="2000" dirty="0">
-                <a:latin typeface="Algerian" panose="04020705040A02060702" pitchFamily="82" charset="0"/>
-              </a:rPr>
-              <a:t> </a:t>
-            </a:r>
-            <a:r>
-              <a:rPr lang="en-US" sz="2000" dirty="0">
-                <a:solidFill>
-                  <a:srgbClr val="FF0000"/>
-                </a:solidFill>
-                <a:latin typeface="Algerian" panose="04020705040A02060702" pitchFamily="82" charset="0"/>
-              </a:rPr>
-              <a:t>AS</a:t>
-            </a:r>
-            <a:r>
-              <a:rPr lang="en-US" sz="2000" dirty="0">
-                <a:latin typeface="Algerian" panose="04020705040A02060702" pitchFamily="82" charset="0"/>
-              </a:rPr>
-              <a:t> </a:t>
-            </a:r>
-            <a:r>
-              <a:rPr lang="en-US" sz="2000" dirty="0" err="1">
-                <a:latin typeface="Algerian" panose="04020705040A02060702" pitchFamily="82" charset="0"/>
-              </a:rPr>
-              <a:t>max_s</a:t>
-            </a:r>
-            <a:endParaRPr lang="en-US" sz="2000" dirty="0">
-              <a:latin typeface="Algerian" panose="04020705040A02060702" pitchFamily="82" charset="0"/>
-            </a:endParaRPr>
-          </a:p>
-          <a:p>
-            <a:r>
-              <a:rPr lang="en-US" sz="2000" dirty="0">
-                <a:solidFill>
-                  <a:srgbClr val="FF0000"/>
-                </a:solidFill>
-                <a:latin typeface="Algerian" panose="04020705040A02060702" pitchFamily="82" charset="0"/>
-              </a:rPr>
-              <a:t>WHERE</a:t>
-            </a:r>
-            <a:r>
-              <a:rPr lang="en-US" sz="2000" dirty="0">
-                <a:latin typeface="Algerian" panose="04020705040A02060702" pitchFamily="82" charset="0"/>
-              </a:rPr>
-              <a:t> </a:t>
-            </a:r>
-            <a:r>
-              <a:rPr lang="en-US" sz="2000" dirty="0" err="1">
-                <a:latin typeface="Algerian" panose="04020705040A02060702" pitchFamily="82" charset="0"/>
-              </a:rPr>
-              <a:t>Submissions.ProblemId</a:t>
-            </a:r>
-            <a:r>
-              <a:rPr lang="en-US" sz="2000" dirty="0">
-                <a:latin typeface="Algerian" panose="04020705040A02060702" pitchFamily="82" charset="0"/>
-              </a:rPr>
-              <a:t> </a:t>
-            </a:r>
-            <a:r>
-              <a:rPr lang="en-US" sz="2000" dirty="0">
-                <a:solidFill>
-                  <a:srgbClr val="FF0000"/>
-                </a:solidFill>
-                <a:latin typeface="Algerian" panose="04020705040A02060702" pitchFamily="82" charset="0"/>
-              </a:rPr>
-              <a:t>=</a:t>
-            </a:r>
-            <a:r>
-              <a:rPr lang="en-US" sz="2000" dirty="0">
-                <a:latin typeface="Algerian" panose="04020705040A02060702" pitchFamily="82" charset="0"/>
-              </a:rPr>
-              <a:t> </a:t>
-            </a:r>
-            <a:r>
-              <a:rPr lang="en-US" sz="2000" dirty="0" err="1">
-                <a:latin typeface="Algerian" panose="04020705040A02060702" pitchFamily="82" charset="0"/>
-              </a:rPr>
-              <a:t>max_s.ProblemId</a:t>
-            </a:r>
-            <a:r>
-              <a:rPr lang="en-US" sz="2000" dirty="0">
-                <a:latin typeface="Algerian" panose="04020705040A02060702" pitchFamily="82" charset="0"/>
-              </a:rPr>
-              <a:t> </a:t>
-            </a:r>
-          </a:p>
-          <a:p>
-            <a:r>
-              <a:rPr lang="en-US" sz="2000" dirty="0">
-                <a:solidFill>
-                  <a:srgbClr val="FF0000"/>
-                </a:solidFill>
-                <a:latin typeface="Algerian" panose="04020705040A02060702" pitchFamily="82" charset="0"/>
-              </a:rPr>
-              <a:t>AND</a:t>
-            </a:r>
-            <a:r>
-              <a:rPr lang="en-US" sz="2000" dirty="0">
-                <a:latin typeface="Algerian" panose="04020705040A02060702" pitchFamily="82" charset="0"/>
-              </a:rPr>
-              <a:t> </a:t>
-            </a:r>
-            <a:r>
-              <a:rPr lang="en-US" sz="2000" dirty="0" err="1">
-                <a:latin typeface="Algerian" panose="04020705040A02060702" pitchFamily="82" charset="0"/>
-              </a:rPr>
-              <a:t>Submissions.ActualPoints</a:t>
-            </a:r>
-            <a:r>
-              <a:rPr lang="en-US" sz="2000" dirty="0">
-                <a:latin typeface="Algerian" panose="04020705040A02060702" pitchFamily="82" charset="0"/>
-              </a:rPr>
-              <a:t> = </a:t>
-            </a:r>
-            <a:r>
-              <a:rPr lang="en-US" sz="2000" dirty="0" err="1">
-                <a:latin typeface="Algerian" panose="04020705040A02060702" pitchFamily="82" charset="0"/>
-              </a:rPr>
-              <a:t>max_s</a:t>
-            </a:r>
-            <a:r>
-              <a:rPr lang="en-US" sz="2000" dirty="0">
-                <a:latin typeface="Algerian" panose="04020705040A02060702" pitchFamily="82" charset="0"/>
-              </a:rPr>
-              <a:t>.</a:t>
-            </a:r>
-            <a:r>
-              <a:rPr lang="en-US" sz="2000" dirty="0">
-                <a:solidFill>
-                  <a:schemeClr val="accent4"/>
-                </a:solidFill>
-                <a:latin typeface="Algerian" panose="04020705040A02060702" pitchFamily="82" charset="0"/>
-              </a:rPr>
-              <a:t>[</a:t>
-            </a:r>
-            <a:r>
-              <a:rPr lang="en-US" sz="2000" dirty="0">
-                <a:latin typeface="Algerian" panose="04020705040A02060702" pitchFamily="82" charset="0"/>
-              </a:rPr>
-              <a:t>Max Points</a:t>
-            </a:r>
-            <a:r>
-              <a:rPr lang="en-US" sz="2000" dirty="0">
-                <a:solidFill>
-                  <a:schemeClr val="accent4"/>
-                </a:solidFill>
-                <a:latin typeface="Algerian" panose="04020705040A02060702" pitchFamily="82" charset="0"/>
-              </a:rPr>
-              <a:t>]</a:t>
-            </a:r>
-            <a:r>
-              <a:rPr lang="en-US" sz="2000" dirty="0">
-                <a:latin typeface="Algerian" panose="04020705040A02060702" pitchFamily="82" charset="0"/>
-              </a:rPr>
-              <a:t>;</a:t>
-            </a:r>
-          </a:p>
-        </p:txBody>
-      </p:sp>
-    </p:spTree>
-    <p:extLst>
-      <p:ext uri="{BB962C8B-B14F-4D97-AF65-F5344CB8AC3E}">
-        <p14:creationId xmlns:p14="http://schemas.microsoft.com/office/powerpoint/2010/main" val="3605120774"/>
-      </p:ext>
-    </p:extLst>
-  </p:cSld>
-  <p:clrMapOvr>
-    <a:masterClrMapping/>
-  </p:clrMapOvr>
-</p:sld>
-</file>
-
-<file path=ppt/slides/slide13.xml><?xml version="1.0" encoding="utf-8"?>
-<p:sld xmlns:a="http://schemas.openxmlformats.org/drawingml/2006/main" xmlns:r="http://schemas.openxmlformats.org/officeDocument/2006/relationships" xmlns:p="http://schemas.openxmlformats.org/presentationml/2006/main">
-  <p:cSld>
-    <p:spTree>
-      <p:nvGrpSpPr>
-        <p:cNvPr id="1" name=""/>
-        <p:cNvGrpSpPr/>
-        <p:nvPr/>
-      </p:nvGrpSpPr>
-      <p:grpSpPr>
-        <a:xfrm>
-          <a:off x="0" y="0"/>
-          <a:ext cx="0" cy="0"/>
-          <a:chOff x="0" y="0"/>
-          <a:chExt cx="0" cy="0"/>
-        </a:xfrm>
-      </p:grpSpPr>
-      <p:sp>
-        <p:nvSpPr>
-          <p:cNvPr id="2" name="Title 1">
-            <a:extLst>
-              <a:ext uri="{FF2B5EF4-FFF2-40B4-BE49-F238E27FC236}">
                 <a16:creationId xmlns:a16="http://schemas.microsoft.com/office/drawing/2014/main" id="{AEAE0E92-F65A-255A-F7EB-A13AAE44C669}"/>
               </a:ext>
             </a:extLst>
@@ -4871,7 +3547,7 @@
 </p:sld>
 </file>
 
-<file path=ppt/slides/slide14.xml><?xml version="1.0" encoding="utf-8"?>
+<file path=ppt/slides/slide11.xml><?xml version="1.0" encoding="utf-8"?>
 <p:sld xmlns:a="http://schemas.openxmlformats.org/drawingml/2006/main" xmlns:r="http://schemas.openxmlformats.org/officeDocument/2006/relationships" xmlns:p="http://schemas.openxmlformats.org/presentationml/2006/main">
   <p:cSld>
     <p:spTree>
@@ -5350,7 +4026,7 @@
 </p:sld>
 </file>
 
-<file path=ppt/slides/slide15.xml><?xml version="1.0" encoding="utf-8"?>
+<file path=ppt/slides/slide12.xml><?xml version="1.0" encoding="utf-8"?>
 <p:sld xmlns:a="http://schemas.openxmlformats.org/drawingml/2006/main" xmlns:r="http://schemas.openxmlformats.org/officeDocument/2006/relationships" xmlns:p="http://schemas.openxmlformats.org/presentationml/2006/main">
   <p:cSld>
     <p:spTree>
@@ -5385,7 +4061,7 @@
         </p:nvSpPr>
         <p:spPr>
           <a:xfrm>
-            <a:off x="252761" y="123515"/>
+            <a:off x="647043" y="182238"/>
             <a:ext cx="10515600" cy="1325563"/>
           </a:xfrm>
         </p:spPr>
@@ -5394,12 +4070,12 @@
           <a:lstStyle/>
           <a:p>
             <a:r>
-              <a:rPr lang="en-US" dirty="0" err="1">
+              <a:rPr lang="en-US" b="1" i="1" dirty="0" err="1">
                 <a:cs typeface="Calibri Light"/>
               </a:rPr>
               <a:t>Ограничения</a:t>
             </a:r>
-            <a:endParaRPr lang="en-US" dirty="0" err="1"/>
+            <a:endParaRPr lang="en-US" b="1" i="1" dirty="0" err="1"/>
           </a:p>
         </p:txBody>
       </p:sp>
@@ -5417,7 +4093,7 @@
         </p:nvSpPr>
         <p:spPr>
           <a:xfrm>
-            <a:off x="172720" y="1625600"/>
+            <a:off x="647043" y="1997839"/>
             <a:ext cx="7294880" cy="2862322"/>
           </a:xfrm>
           <a:prstGeom prst="rect">
@@ -5439,14 +4115,18 @@
               <a:buChar char="ü"/>
             </a:pPr>
             <a:r>
-              <a:rPr lang="en-US" dirty="0"/>
-              <a:t>PRIMARY </a:t>
-            </a:r>
-            <a:r>
-              <a:rPr lang="en-US" dirty="0" smtClean="0"/>
-              <a:t>KEY</a:t>
-            </a:r>
-            <a:endParaRPr lang="bg-BG" dirty="0" smtClean="0"/>
+              <a:rPr lang="en-US" dirty="0">
+                <a:solidFill>
+                  <a:srgbClr val="FF0000"/>
+                </a:solidFill>
+              </a:rPr>
+              <a:t>PRIMARY KEY</a:t>
+            </a:r>
+            <a:endParaRPr lang="bg-BG" dirty="0">
+              <a:solidFill>
+                <a:srgbClr val="FF0000"/>
+              </a:solidFill>
+            </a:endParaRPr>
           </a:p>
           <a:p>
             <a:pPr marL="285750" indent="-285750">
@@ -5454,7 +4134,11 @@
               <a:buChar char="ü"/>
             </a:pPr>
             <a:r>
-              <a:rPr lang="en-US" dirty="0" smtClean="0"/>
+              <a:rPr lang="en-US" dirty="0">
+                <a:solidFill>
+                  <a:srgbClr val="FF0000"/>
+                </a:solidFill>
+              </a:rPr>
               <a:t>FOREIGN KEY</a:t>
             </a:r>
           </a:p>
@@ -5464,7 +4148,11 @@
               <a:buChar char="ü"/>
             </a:pPr>
             <a:r>
-              <a:rPr lang="en-US" dirty="0" smtClean="0"/>
+              <a:rPr lang="en-US" dirty="0">
+                <a:solidFill>
+                  <a:srgbClr val="FF0000"/>
+                </a:solidFill>
+              </a:rPr>
               <a:t>IDENTITY</a:t>
             </a:r>
           </a:p>
@@ -5474,14 +4162,34 @@
               <a:buChar char="ü"/>
             </a:pPr>
             <a:r>
-              <a:rPr lang="en-US" dirty="0"/>
-              <a:t>ALTER TABLE Users ADD DEFAULT GETDATE() FOR </a:t>
-            </a:r>
-            <a:r>
-              <a:rPr lang="en-US" dirty="0" err="1" smtClean="0"/>
+              <a:rPr lang="en-US" dirty="0">
+                <a:solidFill>
+                  <a:srgbClr val="FF0000"/>
+                </a:solidFill>
+              </a:rPr>
+              <a:t>ALTER TABLE </a:t>
+            </a:r>
+            <a:r>
+              <a:rPr lang="en-US" dirty="0"/>
+              <a:t>Users </a:t>
+            </a:r>
+            <a:r>
+              <a:rPr lang="en-US" dirty="0">
+                <a:solidFill>
+                  <a:srgbClr val="FF0000"/>
+                </a:solidFill>
+              </a:rPr>
+              <a:t>ADD DEFAULT</a:t>
+            </a:r>
+            <a:r>
+              <a:rPr lang="en-US" dirty="0"/>
+              <a:t> GETDATE() FOR </a:t>
+            </a:r>
+            <a:r>
+              <a:rPr lang="en-US" dirty="0" err="1"/>
               <a:t>CreatedOn</a:t>
             </a:r>
-            <a:endParaRPr lang="en-US" dirty="0" smtClean="0"/>
+            <a:endParaRPr lang="en-US" dirty="0"/>
           </a:p>
           <a:p>
             <a:pPr marL="285750" indent="-285750">
@@ -5489,8 +4197,28 @@
               <a:buChar char="ü"/>
             </a:pPr>
             <a:r>
-              <a:rPr lang="en-US" dirty="0"/>
-              <a:t>ALTER TABLE Users ADD CONSTRAINT </a:t>
+              <a:rPr lang="en-US" dirty="0">
+                <a:solidFill>
+                  <a:srgbClr val="FF0000"/>
+                </a:solidFill>
+              </a:rPr>
+              <a:t>ALTER TABLE</a:t>
+            </a:r>
+            <a:r>
+              <a:rPr lang="en-US" dirty="0"/>
+              <a:t> Users </a:t>
+            </a:r>
+            <a:r>
+              <a:rPr lang="en-US" dirty="0">
+                <a:solidFill>
+                  <a:srgbClr val="FF0000"/>
+                </a:solidFill>
+              </a:rPr>
+              <a:t>ADD CONSTRAINT</a:t>
+            </a:r>
+            <a:r>
+              <a:rPr lang="en-US" dirty="0"/>
+              <a:t> </a:t>
             </a:r>
             <a:r>
               <a:rPr lang="en-US" dirty="0" err="1"/>
@@ -5505,7 +4233,7 @@
               <a:t>UserName</a:t>
             </a:r>
             <a:r>
-              <a:rPr lang="en-US" dirty="0" smtClean="0"/>
+              <a:rPr lang="en-US" dirty="0"/>
               <a:t>)</a:t>
             </a:r>
           </a:p>
@@ -5515,7 +4243,11 @@
               <a:buChar char="ü"/>
             </a:pPr>
             <a:r>
-              <a:rPr lang="en-US" dirty="0"/>
+              <a:rPr lang="en-US" dirty="0">
+                <a:solidFill>
+                  <a:srgbClr val="FF0000"/>
+                </a:solidFill>
+              </a:rPr>
               <a:t>ALTER TABLE </a:t>
             </a:r>
             <a:r>
@@ -5524,7 +4256,15 @@
             </a:r>
             <a:r>
               <a:rPr lang="en-US" dirty="0"/>
-              <a:t> ADD CONSTRAINT </a:t>
+              <a:t> </a:t>
+            </a:r>
+            <a:r>
+              <a:rPr lang="en-US" dirty="0">
+                <a:solidFill>
+                  <a:srgbClr val="FF0000"/>
+                </a:solidFill>
+              </a:rPr>
+              <a:t>ADD CONSTRAINT </a:t>
             </a:r>
             <a:r>
               <a:rPr lang="en-US" dirty="0" err="1"/>
@@ -5532,7 +4272,19 @@
             </a:r>
             <a:r>
               <a:rPr lang="en-US" dirty="0"/>
-              <a:t> CHECK(</a:t>
+              <a:t> </a:t>
+            </a:r>
+            <a:r>
+              <a:rPr lang="en-US" dirty="0">
+                <a:solidFill>
+                  <a:srgbClr val="FF0000"/>
+                </a:solidFill>
+              </a:rPr>
+              <a:t>CHECK</a:t>
+            </a:r>
+            <a:r>
+              <a:rPr lang="en-US" dirty="0"/>
+              <a:t>(</a:t>
             </a:r>
             <a:r>
               <a:rPr lang="en-US" dirty="0" err="1"/>
@@ -5540,7 +4292,19 @@
             </a:r>
             <a:r>
               <a:rPr lang="en-US" dirty="0"/>
-              <a:t> IN ('Correct', 'Run Time Error', '</a:t>
+              <a:t> </a:t>
+            </a:r>
+            <a:r>
+              <a:rPr lang="en-US" dirty="0">
+                <a:solidFill>
+                  <a:srgbClr val="FF0000"/>
+                </a:solidFill>
+              </a:rPr>
+              <a:t>IN</a:t>
+            </a:r>
+            <a:r>
+              <a:rPr lang="en-US" dirty="0"/>
+              <a:t> ('Correct', 'Run Time Error', '</a:t>
             </a:r>
             <a:r>
               <a:rPr lang="en-US" dirty="0" err="1"/>
@@ -5550,7 +4314,6 @@
               <a:rPr lang="en-US" dirty="0"/>
               <a:t> Error', 'Wrong answer', 'Exceeded Time'))</a:t>
             </a:r>
-            <a:endParaRPr lang="en-US" dirty="0" smtClean="0"/>
           </a:p>
           <a:p>
             <a:pPr marL="285750" indent="-285750">
@@ -5574,7 +4337,7 @@
 </p:sld>
 </file>
 
-<file path=ppt/slides/slide16.xml><?xml version="1.0" encoding="utf-8"?>
+<file path=ppt/slides/slide13.xml><?xml version="1.0" encoding="utf-8"?>
 <p:sld xmlns:a="http://schemas.openxmlformats.org/drawingml/2006/main" xmlns:r="http://schemas.openxmlformats.org/officeDocument/2006/relationships" xmlns:p="http://schemas.openxmlformats.org/presentationml/2006/main">
   <p:cSld>
     <p:spTree>
@@ -5613,12 +4376,12 @@
           <a:lstStyle/>
           <a:p>
             <a:r>
-              <a:rPr lang="en-US" dirty="0" err="1">
+              <a:rPr lang="en-US" b="1" i="1" dirty="0" err="1">
                 <a:cs typeface="Calibri Light"/>
               </a:rPr>
               <a:t>Тригери</a:t>
             </a:r>
-            <a:endParaRPr lang="en-US" dirty="0" err="1"/>
+            <a:endParaRPr lang="en-US" b="1" i="1" dirty="0" err="1"/>
           </a:p>
         </p:txBody>
       </p:sp>
@@ -5643,9 +4406,20 @@
           <a:bodyPr/>
           <a:lstStyle/>
           <a:p>
-            <a:r>
-              <a:rPr lang="en-US" dirty="0"/>
-              <a:t>CREATE TRIGGER </a:t>
+            <a:pPr marL="0" indent="0">
+              <a:buNone/>
+            </a:pPr>
+            <a:r>
+              <a:rPr lang="en-US" dirty="0">
+                <a:solidFill>
+                  <a:srgbClr val="FF0000"/>
+                </a:solidFill>
+              </a:rPr>
+              <a:t>CREATE TRIGGER</a:t>
+            </a:r>
+            <a:r>
+              <a:rPr lang="en-US" dirty="0"/>
+              <a:t> </a:t>
             </a:r>
             <a:r>
               <a:rPr lang="en-US" dirty="0" err="1"/>
@@ -5653,7 +4427,19 @@
             </a:r>
             <a:r>
               <a:rPr lang="en-US" dirty="0"/>
-              <a:t> ON </a:t>
+              <a:t> </a:t>
+            </a:r>
+            <a:r>
+              <a:rPr lang="en-US" dirty="0">
+                <a:solidFill>
+                  <a:srgbClr val="FF0000"/>
+                </a:solidFill>
+              </a:rPr>
+              <a:t>ON</a:t>
+            </a:r>
+            <a:r>
+              <a:rPr lang="en-US" dirty="0"/>
+              <a:t> </a:t>
             </a:r>
             <a:r>
               <a:rPr lang="en-US" dirty="0" err="1"/>
@@ -5661,7 +4447,15 @@
             </a:r>
             <a:r>
               <a:rPr lang="en-US" dirty="0"/>
-              <a:t> FOR DELETE AS INSERT INTO </a:t>
+              <a:t> FOR </a:t>
+            </a:r>
+            <a:r>
+              <a:rPr lang="en-US" dirty="0">
+                <a:solidFill>
+                  <a:srgbClr val="FF0000"/>
+                </a:solidFill>
+              </a:rPr>
+              <a:t>DELETE AS INSERT INTO </a:t>
             </a:r>
             <a:r>
               <a:rPr lang="en-US" dirty="0" err="1"/>
@@ -5725,7 +4519,24 @@
             </a:r>
             <a:r>
               <a:rPr lang="en-US" dirty="0"/>
-              <a:t>) SELECT Id, </a:t>
+              <a:t>) </a:t>
+            </a:r>
+          </a:p>
+          <a:p>
+            <a:pPr marL="0" indent="0">
+              <a:buNone/>
+            </a:pPr>
+            <a:r>
+              <a:rPr lang="en-US" dirty="0">
+                <a:solidFill>
+                  <a:srgbClr val="FF0000"/>
+                </a:solidFill>
+              </a:rPr>
+              <a:t>SELECT</a:t>
+            </a:r>
+            <a:r>
+              <a:rPr lang="en-US" dirty="0"/>
+              <a:t> Id, </a:t>
             </a:r>
             <a:r>
               <a:rPr lang="en-US" dirty="0" err="1"/>
@@ -5781,9 +4592,28 @@
             </a:r>
             <a:r>
               <a:rPr lang="en-US" dirty="0"/>
-              <a:t> FROM deleted GO</a:t>
-            </a:r>
-            <a:endParaRPr lang="en-US" dirty="0"/>
+              <a:t> </a:t>
+            </a:r>
+            <a:r>
+              <a:rPr lang="en-US" dirty="0">
+                <a:solidFill>
+                  <a:srgbClr val="FF0000"/>
+                </a:solidFill>
+              </a:rPr>
+              <a:t>FROM</a:t>
+            </a:r>
+            <a:r>
+              <a:rPr lang="en-US" dirty="0"/>
+              <a:t> deleted </a:t>
+            </a:r>
+            <a:r>
+              <a:rPr lang="en-US" dirty="0">
+                <a:solidFill>
+                  <a:srgbClr val="FF0000"/>
+                </a:solidFill>
+              </a:rPr>
+              <a:t>GO</a:t>
+            </a:r>
           </a:p>
         </p:txBody>
       </p:sp>
@@ -5800,7 +4630,7 @@
 </p:sld>
 </file>
 
-<file path=ppt/slides/slide17.xml><?xml version="1.0" encoding="utf-8"?>
+<file path=ppt/slides/slide14.xml><?xml version="1.0" encoding="utf-8"?>
 <p:sld xmlns:a="http://schemas.openxmlformats.org/drawingml/2006/main" xmlns:r="http://schemas.openxmlformats.org/officeDocument/2006/relationships" xmlns:p="http://schemas.openxmlformats.org/presentationml/2006/main">
   <p:cSld>
     <p:spTree>
@@ -5839,12 +4669,12 @@
           <a:lstStyle/>
           <a:p>
             <a:r>
-              <a:rPr lang="en-US" dirty="0" err="1">
+              <a:rPr lang="en-US" b="1" i="1" dirty="0" err="1">
                 <a:cs typeface="Calibri Light"/>
               </a:rPr>
               <a:t>Изгледи</a:t>
             </a:r>
-            <a:endParaRPr lang="en-US" dirty="0" err="1"/>
+            <a:endParaRPr lang="en-US" b="1" i="1" dirty="0" err="1"/>
           </a:p>
         </p:txBody>
       </p:sp>
@@ -5869,8 +4699,15 @@
           <a:bodyPr/>
           <a:lstStyle/>
           <a:p>
-            <a:r>
-              <a:rPr lang="en-US" dirty="0"/>
+            <a:pPr marL="0" indent="0">
+              <a:buNone/>
+            </a:pPr>
+            <a:r>
+              <a:rPr lang="en-US" dirty="0">
+                <a:solidFill>
+                  <a:srgbClr val="FF0000"/>
+                </a:solidFill>
+              </a:rPr>
               <a:t>CREATE VIEW </a:t>
             </a:r>
             <a:r>
@@ -5879,7 +4716,19 @@
             </a:r>
             <a:r>
               <a:rPr lang="en-US" dirty="0"/>
-              <a:t> AS SELECT </a:t>
+              <a:t> </a:t>
+            </a:r>
+            <a:r>
+              <a:rPr lang="en-US" dirty="0">
+                <a:solidFill>
+                  <a:srgbClr val="FF0000"/>
+                </a:solidFill>
+              </a:rPr>
+              <a:t>AS SELECT</a:t>
+            </a:r>
+            <a:r>
+              <a:rPr lang="en-US" dirty="0"/>
+              <a:t> </a:t>
             </a:r>
             <a:r>
               <a:rPr lang="en-US" dirty="0" err="1"/>
@@ -5887,15 +4736,7 @@
             </a:r>
             <a:r>
               <a:rPr lang="en-US" dirty="0"/>
-              <a:t>, </a:t>
-            </a:r>
-            <a:r>
-              <a:rPr lang="en-US" dirty="0" err="1"/>
-              <a:t>FirstName</a:t>
-            </a:r>
-            <a:r>
-              <a:rPr lang="en-US" dirty="0"/>
-              <a:t>, </a:t>
+              <a:t>, FirstName, </a:t>
             </a:r>
             <a:r>
               <a:rPr lang="en-US" dirty="0" err="1"/>
@@ -5903,7 +4744,31 @@
             </a:r>
             <a:r>
               <a:rPr lang="en-US" dirty="0"/>
-              <a:t> from Users WHERE </a:t>
+              <a:t> </a:t>
+            </a:r>
+            <a:r>
+              <a:rPr lang="en-US" dirty="0">
+                <a:solidFill>
+                  <a:srgbClr val="FF0000"/>
+                </a:solidFill>
+              </a:rPr>
+              <a:t>FROM</a:t>
+            </a:r>
+            <a:r>
+              <a:rPr lang="en-US" dirty="0"/>
+              <a:t> Users </a:t>
+            </a:r>
+            <a:r>
+              <a:rPr lang="en-US" dirty="0">
+                <a:solidFill>
+                  <a:srgbClr val="FF0000"/>
+                </a:solidFill>
+              </a:rPr>
+              <a:t>WHERE</a:t>
+            </a:r>
+            <a:r>
+              <a:rPr lang="en-US" dirty="0"/>
+              <a:t> </a:t>
             </a:r>
             <a:r>
               <a:rPr lang="en-US" dirty="0" err="1"/>
@@ -5911,9 +4776,30 @@
             </a:r>
             <a:r>
               <a:rPr lang="en-US" dirty="0"/>
-              <a:t> = 1</a:t>
-            </a:r>
-            <a:endParaRPr lang="en-US" dirty="0"/>
+              <a:t> </a:t>
+            </a:r>
+            <a:r>
+              <a:rPr lang="en-US" dirty="0">
+                <a:solidFill>
+                  <a:srgbClr val="FF0000"/>
+                </a:solidFill>
+              </a:rPr>
+              <a:t>=</a:t>
+            </a:r>
+            <a:r>
+              <a:rPr lang="en-US" dirty="0"/>
+              <a:t> </a:t>
+            </a:r>
+            <a:r>
+              <a:rPr lang="en-US" dirty="0">
+                <a:solidFill>
+                  <a:schemeClr val="accent1">
+                    <a:lumMod val="75000"/>
+                  </a:schemeClr>
+                </a:solidFill>
+              </a:rPr>
+              <a:t>1</a:t>
+            </a:r>
           </a:p>
         </p:txBody>
       </p:sp>
@@ -5930,7 +4816,7 @@
 </p:sld>
 </file>
 
-<file path=ppt/slides/slide18.xml><?xml version="1.0" encoding="utf-8"?>
+<file path=ppt/slides/slide15.xml><?xml version="1.0" encoding="utf-8"?>
 <p:sld xmlns:a="http://schemas.openxmlformats.org/drawingml/2006/main" xmlns:r="http://schemas.openxmlformats.org/officeDocument/2006/relationships" xmlns:p="http://schemas.openxmlformats.org/presentationml/2006/main">
   <p:cSld>
     <p:spTree>
@@ -6412,7 +5298,7 @@
 </p:sld>
 </file>
 
-<file path=ppt/slides/slide19.xml><?xml version="1.0" encoding="utf-8"?>
+<file path=ppt/slides/slide16.xml><?xml version="1.0" encoding="utf-8"?>
 <p:sld xmlns:a="http://schemas.openxmlformats.org/drawingml/2006/main" xmlns:r="http://schemas.openxmlformats.org/officeDocument/2006/relationships" xmlns:p="http://schemas.openxmlformats.org/presentationml/2006/main">
   <p:cSld>
     <p:spTree>
@@ -7034,389 +5920,7 @@
 </p:sld>
 </file>
 
-<file path=ppt/slides/slide2.xml><?xml version="1.0" encoding="utf-8"?>
-<p:sld xmlns:a="http://schemas.openxmlformats.org/drawingml/2006/main" xmlns:r="http://schemas.openxmlformats.org/officeDocument/2006/relationships" xmlns:p="http://schemas.openxmlformats.org/presentationml/2006/main">
-  <p:cSld>
-    <p:spTree>
-      <p:nvGrpSpPr>
-        <p:cNvPr id="1" name=""/>
-        <p:cNvGrpSpPr/>
-        <p:nvPr/>
-      </p:nvGrpSpPr>
-      <p:grpSpPr>
-        <a:xfrm>
-          <a:off x="0" y="0"/>
-          <a:ext cx="0" cy="0"/>
-          <a:chOff x="0" y="0"/>
-          <a:chExt cx="0" cy="0"/>
-        </a:xfrm>
-      </p:grpSpPr>
-      <p:sp>
-        <p:nvSpPr>
-          <p:cNvPr id="2" name="Title 1">
-            <a:extLst>
-              <a:ext uri="{FF2B5EF4-FFF2-40B4-BE49-F238E27FC236}">
-                <a16:creationId xmlns:a16="http://schemas.microsoft.com/office/drawing/2014/main" id="{9A21B18B-BBE5-C1DC-0CE5-D4D557ABBD18}"/>
-              </a:ext>
-            </a:extLst>
-          </p:cNvPr>
-          <p:cNvSpPr>
-            <a:spLocks noGrp="1"/>
-          </p:cNvSpPr>
-          <p:nvPr>
-            <p:ph type="title"/>
-          </p:nvPr>
-        </p:nvSpPr>
-        <p:spPr>
-          <a:xfrm>
-            <a:off x="122664" y="1089954"/>
-            <a:ext cx="12030305" cy="4968294"/>
-          </a:xfrm>
-        </p:spPr>
-        <p:txBody>
-          <a:bodyPr>
-            <a:normAutofit fontScale="90000"/>
-          </a:bodyPr>
-          <a:lstStyle/>
-          <a:p>
-            <a:r>
-              <a:rPr lang="en-US" b="1" dirty="0">
-                <a:latin typeface="Algerian"/>
-                <a:cs typeface="Calibri Light"/>
-              </a:rPr>
-              <a:t>SELECT</a:t>
-            </a:r>
-            <a:r>
-              <a:rPr lang="en-US" dirty="0">
-                <a:latin typeface="Algerian"/>
-                <a:cs typeface="Calibri Light"/>
-              </a:rPr>
-              <a:t> </a:t>
-            </a:r>
-            <a:r>
-              <a:rPr lang="en-US" dirty="0">
-                <a:solidFill>
-                  <a:srgbClr val="FF0000"/>
-                </a:solidFill>
-                <a:latin typeface="Algerian"/>
-                <a:cs typeface="Calibri Light"/>
-              </a:rPr>
-              <a:t>*</a:t>
-            </a:r>
-            <a:r>
-              <a:rPr lang="en-US" dirty="0">
-                <a:latin typeface="Algerian"/>
-                <a:cs typeface="Calibri Light"/>
-              </a:rPr>
-              <a:t/>
-            </a:r>
-            <a:br>
-              <a:rPr lang="en-US" dirty="0">
-                <a:latin typeface="Algerian"/>
-                <a:cs typeface="Calibri Light"/>
-              </a:rPr>
-            </a:br>
-            <a:r>
-              <a:rPr lang="en-US" b="1" dirty="0">
-                <a:latin typeface="Algerian"/>
-                <a:cs typeface="Calibri Light"/>
-              </a:rPr>
-              <a:t>FROM</a:t>
-            </a:r>
-            <a:r>
-              <a:rPr lang="en-US" dirty="0">
-                <a:latin typeface="Algerian"/>
-                <a:cs typeface="Calibri Light"/>
-              </a:rPr>
-              <a:t> </a:t>
-            </a:r>
-            <a:r>
-              <a:rPr lang="en-US" dirty="0">
-                <a:solidFill>
-                  <a:srgbClr val="FF0000"/>
-                </a:solidFill>
-                <a:latin typeface="Algerian"/>
-                <a:cs typeface="Calibri Light"/>
-              </a:rPr>
-              <a:t>DB_PROJECTS</a:t>
-            </a:r>
-            <a:r>
-              <a:rPr lang="en-US" dirty="0">
-                <a:latin typeface="Algerian"/>
-                <a:cs typeface="Calibri Light"/>
-              </a:rPr>
-              <a:t/>
-            </a:r>
-            <a:br>
-              <a:rPr lang="en-US" dirty="0">
-                <a:latin typeface="Algerian"/>
-                <a:cs typeface="Calibri Light"/>
-              </a:rPr>
-            </a:br>
-            <a:r>
-              <a:rPr lang="en-US" b="1" dirty="0">
-                <a:latin typeface="Algerian"/>
-                <a:cs typeface="Calibri Light"/>
-              </a:rPr>
-              <a:t>WHERE</a:t>
-            </a:r>
-            <a:r>
-              <a:rPr lang="en-US" dirty="0">
-                <a:latin typeface="Algerian"/>
-                <a:cs typeface="Calibri Light"/>
-              </a:rPr>
-              <a:t> </a:t>
-            </a:r>
-            <a:r>
-              <a:rPr lang="en-US" dirty="0" err="1">
-                <a:solidFill>
-                  <a:srgbClr val="FF0000"/>
-                </a:solidFill>
-                <a:latin typeface="Algerian"/>
-                <a:cs typeface="Calibri Light"/>
-              </a:rPr>
-              <a:t>DB_PROJECTS.</a:t>
-            </a:r>
-            <a:r>
-              <a:rPr lang="en-US" dirty="0" err="1">
-                <a:solidFill>
-                  <a:srgbClr val="7030A0"/>
-                </a:solidFill>
-                <a:latin typeface="Algerian"/>
-                <a:cs typeface="Calibri Light"/>
-              </a:rPr>
-              <a:t>Participants</a:t>
-            </a:r>
-            <a:r>
-              <a:rPr lang="en-US" dirty="0">
-                <a:latin typeface="Algerian"/>
-                <a:cs typeface="Calibri Light"/>
-              </a:rPr>
-              <a:t> = </a:t>
-            </a:r>
-            <a:r>
-              <a:rPr lang="en-US" dirty="0">
-                <a:solidFill>
-                  <a:schemeClr val="accent6"/>
-                </a:solidFill>
-                <a:latin typeface="Algerian"/>
-                <a:cs typeface="Calibri Light"/>
-              </a:rPr>
-              <a:t>'</a:t>
-            </a:r>
-            <a:r>
-              <a:rPr lang="en-US" dirty="0" err="1">
-                <a:solidFill>
-                  <a:schemeClr val="accent6"/>
-                </a:solidFill>
-                <a:latin typeface="Algerian"/>
-                <a:cs typeface="Calibri Light"/>
-              </a:rPr>
-              <a:t>Preso</a:t>
-            </a:r>
-            <a:r>
-              <a:rPr lang="en-US" dirty="0">
-                <a:solidFill>
-                  <a:schemeClr val="accent6"/>
-                </a:solidFill>
-                <a:latin typeface="Algerian"/>
-                <a:cs typeface="Calibri Light"/>
-              </a:rPr>
-              <a:t>'</a:t>
-            </a:r>
-            <a:r>
-              <a:rPr lang="en-US" dirty="0">
-                <a:latin typeface="Algerian"/>
-                <a:cs typeface="Calibri Light"/>
-              </a:rPr>
-              <a:t> </a:t>
-            </a:r>
-            <a:r>
-              <a:rPr lang="en-US" b="1" dirty="0">
-                <a:latin typeface="Algerian"/>
-                <a:cs typeface="Calibri Light"/>
-              </a:rPr>
-              <a:t>OR</a:t>
-            </a:r>
-            <a:br>
-              <a:rPr lang="en-US" b="1" dirty="0">
-                <a:latin typeface="Algerian"/>
-                <a:cs typeface="Calibri Light"/>
-              </a:rPr>
-            </a:br>
-            <a:r>
-              <a:rPr lang="en-US" dirty="0">
-                <a:latin typeface="Algerian"/>
-                <a:cs typeface="Calibri Light"/>
-              </a:rPr>
-              <a:t>              </a:t>
-            </a:r>
-            <a:r>
-              <a:rPr lang="en-US" dirty="0" err="1">
-                <a:solidFill>
-                  <a:srgbClr val="FF0000"/>
-                </a:solidFill>
-                <a:latin typeface="Algerian"/>
-                <a:ea typeface="+mj-lt"/>
-                <a:cs typeface="+mj-lt"/>
-              </a:rPr>
-              <a:t>DB_PROJECTS.</a:t>
-            </a:r>
-            <a:r>
-              <a:rPr lang="en-US" dirty="0" err="1">
-                <a:solidFill>
-                  <a:srgbClr val="7030A0"/>
-                </a:solidFill>
-                <a:latin typeface="Algerian"/>
-                <a:ea typeface="+mj-lt"/>
-                <a:cs typeface="+mj-lt"/>
-              </a:rPr>
-              <a:t>Participants</a:t>
-            </a:r>
-            <a:r>
-              <a:rPr lang="en-US" dirty="0">
-                <a:latin typeface="Algerian"/>
-                <a:ea typeface="+mj-lt"/>
-                <a:cs typeface="+mj-lt"/>
-              </a:rPr>
-              <a:t> = </a:t>
-            </a:r>
-            <a:r>
-              <a:rPr lang="en-US" dirty="0">
-                <a:solidFill>
-                  <a:schemeClr val="accent6"/>
-                </a:solidFill>
-                <a:latin typeface="Algerian"/>
-                <a:ea typeface="+mj-lt"/>
-                <a:cs typeface="+mj-lt"/>
-              </a:rPr>
-              <a:t>'Nasko'</a:t>
-            </a:r>
-            <a:r>
-              <a:rPr lang="en-US" dirty="0">
-                <a:latin typeface="Algerian"/>
-                <a:ea typeface="+mj-lt"/>
-                <a:cs typeface="+mj-lt"/>
-              </a:rPr>
-              <a:t> </a:t>
-            </a:r>
-            <a:r>
-              <a:rPr lang="en-US" b="1" dirty="0">
-                <a:latin typeface="Algerian"/>
-                <a:ea typeface="+mj-lt"/>
-                <a:cs typeface="+mj-lt"/>
-              </a:rPr>
-              <a:t>OR</a:t>
-            </a:r>
-            <a:r>
-              <a:rPr lang="en-US" b="1" dirty="0">
-                <a:latin typeface="Algerian"/>
-              </a:rPr>
-              <a:t/>
-            </a:r>
-            <a:br>
-              <a:rPr lang="en-US" b="1" dirty="0">
-                <a:latin typeface="Algerian"/>
-              </a:rPr>
-            </a:br>
-            <a:r>
-              <a:rPr lang="en-US" dirty="0">
-                <a:latin typeface="Algerian"/>
-                <a:ea typeface="+mj-lt"/>
-                <a:cs typeface="+mj-lt"/>
-              </a:rPr>
-              <a:t>              </a:t>
-            </a:r>
-            <a:r>
-              <a:rPr lang="en-US" dirty="0" err="1">
-                <a:solidFill>
-                  <a:srgbClr val="FF0000"/>
-                </a:solidFill>
-                <a:latin typeface="Algerian"/>
-                <a:ea typeface="+mj-lt"/>
-                <a:cs typeface="+mj-lt"/>
-              </a:rPr>
-              <a:t>DB_PROJECTS.</a:t>
-            </a:r>
-            <a:r>
-              <a:rPr lang="en-US" dirty="0" err="1">
-                <a:solidFill>
-                  <a:srgbClr val="7030A0"/>
-                </a:solidFill>
-                <a:latin typeface="Algerian"/>
-                <a:ea typeface="+mj-lt"/>
-                <a:cs typeface="+mj-lt"/>
-              </a:rPr>
-              <a:t>Participants</a:t>
-            </a:r>
-            <a:r>
-              <a:rPr lang="en-US" dirty="0">
-                <a:latin typeface="Algerian"/>
-                <a:ea typeface="+mj-lt"/>
-                <a:cs typeface="+mj-lt"/>
-              </a:rPr>
-              <a:t> = </a:t>
-            </a:r>
-            <a:r>
-              <a:rPr lang="en-US" dirty="0">
-                <a:solidFill>
-                  <a:schemeClr val="accent6"/>
-                </a:solidFill>
-                <a:latin typeface="Algerian"/>
-                <a:ea typeface="+mj-lt"/>
-                <a:cs typeface="+mj-lt"/>
-              </a:rPr>
-              <a:t>'Hari'</a:t>
-            </a:r>
-            <a:r>
-              <a:rPr lang="en-US" dirty="0">
-                <a:latin typeface="Algerian"/>
-                <a:ea typeface="+mj-lt"/>
-                <a:cs typeface="+mj-lt"/>
-              </a:rPr>
-              <a:t>;</a:t>
-            </a:r>
-            <a:br>
-              <a:rPr lang="en-US" dirty="0">
-                <a:latin typeface="Algerian"/>
-                <a:ea typeface="+mj-lt"/>
-                <a:cs typeface="+mj-lt"/>
-              </a:rPr>
-            </a:br>
-            <a:r>
-              <a:rPr lang="en-US" dirty="0">
-                <a:ea typeface="+mj-lt"/>
-                <a:cs typeface="+mj-lt"/>
-              </a:rPr>
-              <a:t/>
-            </a:r>
-            <a:br>
-              <a:rPr lang="en-US" dirty="0">
-                <a:ea typeface="+mj-lt"/>
-                <a:cs typeface="+mj-lt"/>
-              </a:rPr>
-            </a:br>
-            <a:endParaRPr lang="en-US" dirty="0">
-              <a:ea typeface="+mj-lt"/>
-              <a:cs typeface="+mj-lt"/>
-            </a:endParaRPr>
-          </a:p>
-        </p:txBody>
-      </p:sp>
-    </p:spTree>
-    <p:extLst>
-      <p:ext uri="{BB962C8B-B14F-4D97-AF65-F5344CB8AC3E}">
-        <p14:creationId xmlns:p14="http://schemas.microsoft.com/office/powerpoint/2010/main" val="282574986"/>
-      </p:ext>
-    </p:extLst>
-  </p:cSld>
-  <p:clrMapOvr>
-    <a:masterClrMapping/>
-  </p:clrMapOvr>
-</p:sld>
-</file>
-
-<file path=ppt/slides/slide20.xml><?xml version="1.0" encoding="utf-8"?>
+<file path=ppt/slides/slide17.xml><?xml version="1.0" encoding="utf-8"?>
 <p:sld xmlns:a="http://schemas.openxmlformats.org/drawingml/2006/main" xmlns:r="http://schemas.openxmlformats.org/officeDocument/2006/relationships" xmlns:p="http://schemas.openxmlformats.org/presentationml/2006/main">
   <p:cSld>
     <p:bg>
@@ -7449,7 +5953,7 @@
                 <a16:creationId xmlns:a16="http://schemas.microsoft.com/office/drawing/2014/main" id="{18873D23-2DCF-4B31-A009-95721C06E8E1}"/>
               </a:ext>
               <a:ext uri="{C183D7F6-B498-43B3-948B-1728B52AA6E4}">
-                <adec:decorative xmlns:adec="http://schemas.microsoft.com/office/drawing/2017/decorative" xmlns="" val="1"/>
+                <adec:decorative xmlns:adec="http://schemas.microsoft.com/office/drawing/2017/decorative" val="1"/>
               </a:ext>
             </a:extLst>
           </p:cNvPr>
@@ -7509,7 +6013,7 @@
                 <a16:creationId xmlns:a16="http://schemas.microsoft.com/office/drawing/2014/main" id="{C13EF075-D4EF-4929-ADBC-91B27DA19955}"/>
               </a:ext>
               <a:ext uri="{C183D7F6-B498-43B3-948B-1728B52AA6E4}">
-                <adec:decorative xmlns:adec="http://schemas.microsoft.com/office/drawing/2017/decorative" xmlns="" val="1"/>
+                <adec:decorative xmlns:adec="http://schemas.microsoft.com/office/drawing/2017/decorative" val="1"/>
               </a:ext>
             </a:extLst>
           </p:cNvPr>
@@ -7572,7 +6076,7 @@
                 <a16:creationId xmlns:a16="http://schemas.microsoft.com/office/drawing/2014/main" id="{DAA26DFA-AAB2-4973-9C17-16D587C7B198}"/>
               </a:ext>
               <a:ext uri="{C183D7F6-B498-43B3-948B-1728B52AA6E4}">
-                <adec:decorative xmlns:adec="http://schemas.microsoft.com/office/drawing/2017/decorative" xmlns="" val="1"/>
+                <adec:decorative xmlns:adec="http://schemas.microsoft.com/office/drawing/2017/decorative" val="1"/>
               </a:ext>
             </a:extLst>
           </p:cNvPr>
@@ -7603,7 +6107,7 @@
                   <a16:creationId xmlns:a16="http://schemas.microsoft.com/office/drawing/2014/main" id="{3F407F11-7321-4BF6-8536-CCE8E342454B}"/>
                 </a:ext>
                 <a:ext uri="{C183D7F6-B498-43B3-948B-1728B52AA6E4}">
-                  <adec:decorative xmlns:adec="http://schemas.microsoft.com/office/drawing/2017/decorative" xmlns="" val="1"/>
+                  <adec:decorative xmlns:adec="http://schemas.microsoft.com/office/drawing/2017/decorative" val="1"/>
                 </a:ext>
               </a:extLst>
             </p:cNvPr>
@@ -9505,7 +8009,7 @@
                   <a16:creationId xmlns:a16="http://schemas.microsoft.com/office/drawing/2014/main" id="{06AC5DCC-C3CC-4FD5-AD4E-13A1BE5F7F68}"/>
                 </a:ext>
                 <a:ext uri="{C183D7F6-B498-43B3-948B-1728B52AA6E4}">
-                  <adec:decorative xmlns:adec="http://schemas.microsoft.com/office/drawing/2017/decorative" xmlns="" val="1"/>
+                  <adec:decorative xmlns:adec="http://schemas.microsoft.com/office/drawing/2017/decorative" val="1"/>
                 </a:ext>
               </a:extLst>
             </p:cNvPr>
@@ -9887,7 +8391,7 @@
                   <a16:creationId xmlns:a16="http://schemas.microsoft.com/office/drawing/2014/main" id="{4BBCC2F4-EFA7-4AF4-B538-AC4022D90F47}"/>
                 </a:ext>
                 <a:ext uri="{C183D7F6-B498-43B3-948B-1728B52AA6E4}">
-                  <adec:decorative xmlns:adec="http://schemas.microsoft.com/office/drawing/2017/decorative" xmlns="" val="1"/>
+                  <adec:decorative xmlns:adec="http://schemas.microsoft.com/office/drawing/2017/decorative" val="1"/>
                 </a:ext>
               </a:extLst>
             </p:cNvPr>
@@ -10249,7 +8753,7 @@
                   <a16:creationId xmlns:a16="http://schemas.microsoft.com/office/drawing/2014/main" id="{2A9D1364-B6A3-44CB-9FBA-C528F0CE909D}"/>
                 </a:ext>
                 <a:ext uri="{C183D7F6-B498-43B3-948B-1728B52AA6E4}">
-                  <adec:decorative xmlns:adec="http://schemas.microsoft.com/office/drawing/2017/decorative" xmlns="" val="1"/>
+                  <adec:decorative xmlns:adec="http://schemas.microsoft.com/office/drawing/2017/decorative" val="1"/>
                 </a:ext>
               </a:extLst>
             </p:cNvPr>
@@ -10911,7 +9415,7 @@
 </p:sld>
 </file>
 
-<file path=ppt/slides/slide21.xml><?xml version="1.0" encoding="utf-8"?>
+<file path=ppt/slides/slide18.xml><?xml version="1.0" encoding="utf-8"?>
 <p:sld xmlns:a="http://schemas.openxmlformats.org/drawingml/2006/main" xmlns:r="http://schemas.openxmlformats.org/officeDocument/2006/relationships" xmlns:p="http://schemas.openxmlformats.org/presentationml/2006/main">
   <p:cSld>
     <p:spTree>
@@ -11021,6 +9525,372 @@
 </p:sld>
 </file>
 
+<file path=ppt/slides/slide2.xml><?xml version="1.0" encoding="utf-8"?>
+<p:sld xmlns:a="http://schemas.openxmlformats.org/drawingml/2006/main" xmlns:r="http://schemas.openxmlformats.org/officeDocument/2006/relationships" xmlns:p="http://schemas.openxmlformats.org/presentationml/2006/main">
+  <p:cSld>
+    <p:spTree>
+      <p:nvGrpSpPr>
+        <p:cNvPr id="1" name=""/>
+        <p:cNvGrpSpPr/>
+        <p:nvPr/>
+      </p:nvGrpSpPr>
+      <p:grpSpPr>
+        <a:xfrm>
+          <a:off x="0" y="0"/>
+          <a:ext cx="0" cy="0"/>
+          <a:chOff x="0" y="0"/>
+          <a:chExt cx="0" cy="0"/>
+        </a:xfrm>
+      </p:grpSpPr>
+      <p:sp>
+        <p:nvSpPr>
+          <p:cNvPr id="2" name="Title 1">
+            <a:extLst>
+              <a:ext uri="{FF2B5EF4-FFF2-40B4-BE49-F238E27FC236}">
+                <a16:creationId xmlns:a16="http://schemas.microsoft.com/office/drawing/2014/main" id="{9A21B18B-BBE5-C1DC-0CE5-D4D557ABBD18}"/>
+              </a:ext>
+            </a:extLst>
+          </p:cNvPr>
+          <p:cNvSpPr>
+            <a:spLocks noGrp="1"/>
+          </p:cNvSpPr>
+          <p:nvPr>
+            <p:ph type="title"/>
+          </p:nvPr>
+        </p:nvSpPr>
+        <p:spPr>
+          <a:xfrm>
+            <a:off x="122664" y="1089954"/>
+            <a:ext cx="12030305" cy="4968294"/>
+          </a:xfrm>
+        </p:spPr>
+        <p:txBody>
+          <a:bodyPr>
+            <a:normAutofit fontScale="90000"/>
+          </a:bodyPr>
+          <a:lstStyle/>
+          <a:p>
+            <a:r>
+              <a:rPr lang="en-US" b="1" dirty="0">
+                <a:latin typeface="Algerian"/>
+                <a:cs typeface="Calibri Light"/>
+              </a:rPr>
+              <a:t>SELECT</a:t>
+            </a:r>
+            <a:r>
+              <a:rPr lang="en-US" dirty="0">
+                <a:latin typeface="Algerian"/>
+                <a:cs typeface="Calibri Light"/>
+              </a:rPr>
+              <a:t> </a:t>
+            </a:r>
+            <a:r>
+              <a:rPr lang="en-US" dirty="0">
+                <a:solidFill>
+                  <a:srgbClr val="FF0000"/>
+                </a:solidFill>
+                <a:latin typeface="Algerian"/>
+                <a:cs typeface="Calibri Light"/>
+              </a:rPr>
+              <a:t>*</a:t>
+            </a:r>
+            <a:br>
+              <a:rPr lang="en-US" dirty="0">
+                <a:latin typeface="Algerian"/>
+                <a:cs typeface="Calibri Light"/>
+              </a:rPr>
+            </a:br>
+            <a:r>
+              <a:rPr lang="en-US" b="1" dirty="0">
+                <a:latin typeface="Algerian"/>
+                <a:cs typeface="Calibri Light"/>
+              </a:rPr>
+              <a:t>FROM</a:t>
+            </a:r>
+            <a:r>
+              <a:rPr lang="en-US" dirty="0">
+                <a:latin typeface="Algerian"/>
+                <a:cs typeface="Calibri Light"/>
+              </a:rPr>
+              <a:t> </a:t>
+            </a:r>
+            <a:r>
+              <a:rPr lang="en-US" dirty="0">
+                <a:solidFill>
+                  <a:srgbClr val="FF0000"/>
+                </a:solidFill>
+                <a:latin typeface="Algerian"/>
+                <a:cs typeface="Calibri Light"/>
+              </a:rPr>
+              <a:t>DB_PROJECTS</a:t>
+            </a:r>
+            <a:br>
+              <a:rPr lang="en-US" dirty="0">
+                <a:latin typeface="Algerian"/>
+                <a:cs typeface="Calibri Light"/>
+              </a:rPr>
+            </a:br>
+            <a:r>
+              <a:rPr lang="en-US" b="1" dirty="0">
+                <a:latin typeface="Algerian"/>
+                <a:cs typeface="Calibri Light"/>
+              </a:rPr>
+              <a:t>WHERE</a:t>
+            </a:r>
+            <a:r>
+              <a:rPr lang="en-US" dirty="0">
+                <a:latin typeface="Algerian"/>
+                <a:cs typeface="Calibri Light"/>
+              </a:rPr>
+              <a:t> </a:t>
+            </a:r>
+            <a:r>
+              <a:rPr lang="en-US" dirty="0" err="1">
+                <a:solidFill>
+                  <a:srgbClr val="FF0000"/>
+                </a:solidFill>
+                <a:latin typeface="Algerian"/>
+                <a:cs typeface="Calibri Light"/>
+              </a:rPr>
+              <a:t>DB_PROJECTS.</a:t>
+            </a:r>
+            <a:r>
+              <a:rPr lang="en-US" dirty="0" err="1">
+                <a:solidFill>
+                  <a:srgbClr val="7030A0"/>
+                </a:solidFill>
+                <a:latin typeface="Algerian"/>
+                <a:cs typeface="Calibri Light"/>
+              </a:rPr>
+              <a:t>Participants</a:t>
+            </a:r>
+            <a:r>
+              <a:rPr lang="en-US" dirty="0">
+                <a:latin typeface="Algerian"/>
+                <a:cs typeface="Calibri Light"/>
+              </a:rPr>
+              <a:t> = </a:t>
+            </a:r>
+            <a:r>
+              <a:rPr lang="en-US" dirty="0">
+                <a:solidFill>
+                  <a:schemeClr val="accent6"/>
+                </a:solidFill>
+                <a:latin typeface="Algerian"/>
+                <a:cs typeface="Calibri Light"/>
+              </a:rPr>
+              <a:t>'</a:t>
+            </a:r>
+            <a:r>
+              <a:rPr lang="en-US" dirty="0" err="1">
+                <a:solidFill>
+                  <a:schemeClr val="accent6"/>
+                </a:solidFill>
+                <a:latin typeface="Algerian"/>
+                <a:cs typeface="Calibri Light"/>
+              </a:rPr>
+              <a:t>Preso</a:t>
+            </a:r>
+            <a:r>
+              <a:rPr lang="en-US" dirty="0">
+                <a:solidFill>
+                  <a:schemeClr val="accent6"/>
+                </a:solidFill>
+                <a:latin typeface="Algerian"/>
+                <a:cs typeface="Calibri Light"/>
+              </a:rPr>
+              <a:t>'</a:t>
+            </a:r>
+            <a:r>
+              <a:rPr lang="en-US" dirty="0">
+                <a:latin typeface="Algerian"/>
+                <a:cs typeface="Calibri Light"/>
+              </a:rPr>
+              <a:t> </a:t>
+            </a:r>
+            <a:r>
+              <a:rPr lang="en-US" b="1" dirty="0">
+                <a:latin typeface="Algerian"/>
+                <a:cs typeface="Calibri Light"/>
+              </a:rPr>
+              <a:t>OR</a:t>
+            </a:r>
+            <a:br>
+              <a:rPr lang="en-US" b="1" dirty="0">
+                <a:latin typeface="Algerian"/>
+                <a:cs typeface="Calibri Light"/>
+              </a:rPr>
+            </a:br>
+            <a:r>
+              <a:rPr lang="en-US" dirty="0">
+                <a:latin typeface="Algerian"/>
+                <a:cs typeface="Calibri Light"/>
+              </a:rPr>
+              <a:t>              </a:t>
+            </a:r>
+            <a:r>
+              <a:rPr lang="en-US" dirty="0" err="1">
+                <a:solidFill>
+                  <a:srgbClr val="FF0000"/>
+                </a:solidFill>
+                <a:latin typeface="Algerian"/>
+                <a:ea typeface="+mj-lt"/>
+                <a:cs typeface="+mj-lt"/>
+              </a:rPr>
+              <a:t>DB_PROJECTS.</a:t>
+            </a:r>
+            <a:r>
+              <a:rPr lang="en-US" dirty="0" err="1">
+                <a:solidFill>
+                  <a:srgbClr val="7030A0"/>
+                </a:solidFill>
+                <a:latin typeface="Algerian"/>
+                <a:ea typeface="+mj-lt"/>
+                <a:cs typeface="+mj-lt"/>
+              </a:rPr>
+              <a:t>Participants</a:t>
+            </a:r>
+            <a:r>
+              <a:rPr lang="en-US" dirty="0">
+                <a:latin typeface="Algerian"/>
+                <a:ea typeface="+mj-lt"/>
+                <a:cs typeface="+mj-lt"/>
+              </a:rPr>
+              <a:t> = </a:t>
+            </a:r>
+            <a:r>
+              <a:rPr lang="en-US" dirty="0">
+                <a:solidFill>
+                  <a:schemeClr val="accent6"/>
+                </a:solidFill>
+                <a:latin typeface="Algerian"/>
+                <a:ea typeface="+mj-lt"/>
+                <a:cs typeface="+mj-lt"/>
+              </a:rPr>
+              <a:t>'Nasko'</a:t>
+            </a:r>
+            <a:r>
+              <a:rPr lang="en-US" dirty="0">
+                <a:latin typeface="Algerian"/>
+                <a:ea typeface="+mj-lt"/>
+                <a:cs typeface="+mj-lt"/>
+              </a:rPr>
+              <a:t> </a:t>
+            </a:r>
+            <a:r>
+              <a:rPr lang="en-US" b="1" dirty="0">
+                <a:latin typeface="Algerian"/>
+                <a:ea typeface="+mj-lt"/>
+                <a:cs typeface="+mj-lt"/>
+              </a:rPr>
+              <a:t>OR</a:t>
+            </a:r>
+            <a:br>
+              <a:rPr lang="en-US" b="1" dirty="0">
+                <a:latin typeface="Algerian"/>
+              </a:rPr>
+            </a:br>
+            <a:r>
+              <a:rPr lang="en-US" dirty="0">
+                <a:latin typeface="Algerian"/>
+                <a:ea typeface="+mj-lt"/>
+                <a:cs typeface="+mj-lt"/>
+              </a:rPr>
+              <a:t>              </a:t>
+            </a:r>
+            <a:r>
+              <a:rPr lang="en-US" dirty="0" err="1">
+                <a:solidFill>
+                  <a:srgbClr val="FF0000"/>
+                </a:solidFill>
+                <a:latin typeface="Algerian"/>
+                <a:ea typeface="+mj-lt"/>
+                <a:cs typeface="+mj-lt"/>
+              </a:rPr>
+              <a:t>DB_PROJECTS.</a:t>
+            </a:r>
+            <a:r>
+              <a:rPr lang="en-US" dirty="0" err="1">
+                <a:solidFill>
+                  <a:srgbClr val="7030A0"/>
+                </a:solidFill>
+                <a:latin typeface="Algerian"/>
+                <a:ea typeface="+mj-lt"/>
+                <a:cs typeface="+mj-lt"/>
+              </a:rPr>
+              <a:t>Participants</a:t>
+            </a:r>
+            <a:r>
+              <a:rPr lang="en-US" dirty="0">
+                <a:latin typeface="Algerian"/>
+                <a:ea typeface="+mj-lt"/>
+                <a:cs typeface="+mj-lt"/>
+              </a:rPr>
+              <a:t> = </a:t>
+            </a:r>
+            <a:r>
+              <a:rPr lang="en-US" dirty="0">
+                <a:solidFill>
+                  <a:schemeClr val="accent6"/>
+                </a:solidFill>
+                <a:latin typeface="Algerian"/>
+                <a:ea typeface="+mj-lt"/>
+                <a:cs typeface="+mj-lt"/>
+              </a:rPr>
+              <a:t>‘</a:t>
+            </a:r>
+            <a:r>
+              <a:rPr lang="en-US">
+                <a:solidFill>
+                  <a:schemeClr val="accent6"/>
+                </a:solidFill>
+                <a:latin typeface="Algerian"/>
+                <a:ea typeface="+mj-lt"/>
+                <a:cs typeface="+mj-lt"/>
+              </a:rPr>
+              <a:t>HarKO'</a:t>
+            </a:r>
+            <a:r>
+              <a:rPr lang="en-US">
+                <a:latin typeface="Algerian"/>
+                <a:ea typeface="+mj-lt"/>
+                <a:cs typeface="+mj-lt"/>
+              </a:rPr>
+              <a:t>;</a:t>
+            </a:r>
+            <a:br>
+              <a:rPr lang="en-US" dirty="0">
+                <a:latin typeface="Algerian"/>
+                <a:ea typeface="+mj-lt"/>
+                <a:cs typeface="+mj-lt"/>
+              </a:rPr>
+            </a:br>
+            <a:br>
+              <a:rPr lang="en-US" dirty="0">
+                <a:ea typeface="+mj-lt"/>
+                <a:cs typeface="+mj-lt"/>
+              </a:rPr>
+            </a:br>
+            <a:endParaRPr lang="en-US" dirty="0">
+              <a:ea typeface="+mj-lt"/>
+              <a:cs typeface="+mj-lt"/>
+            </a:endParaRPr>
+          </a:p>
+        </p:txBody>
+      </p:sp>
+    </p:spTree>
+    <p:extLst>
+      <p:ext uri="{BB962C8B-B14F-4D97-AF65-F5344CB8AC3E}">
+        <p14:creationId xmlns:p14="http://schemas.microsoft.com/office/powerpoint/2010/main" val="282574986"/>
+      </p:ext>
+    </p:extLst>
+  </p:cSld>
+  <p:clrMapOvr>
+    <a:masterClrMapping/>
+  </p:clrMapOvr>
+</p:sld>
+</file>
+
 <file path=ppt/slides/slide3.xml><?xml version="1.0" encoding="utf-8"?>
 <p:sld xmlns:a="http://schemas.openxmlformats.org/drawingml/2006/main" xmlns:r="http://schemas.openxmlformats.org/officeDocument/2006/relationships" xmlns:p="http://schemas.openxmlformats.org/presentationml/2006/main">
   <p:cSld>
@@ -11171,237 +10041,6 @@
 </file>
 
 <file path=ppt/slides/slide4.xml><?xml version="1.0" encoding="utf-8"?>
-<p:sld xmlns:a="http://schemas.openxmlformats.org/drawingml/2006/main" xmlns:r="http://schemas.openxmlformats.org/officeDocument/2006/relationships" xmlns:p="http://schemas.openxmlformats.org/presentationml/2006/main">
-  <p:cSld>
-    <p:spTree>
-      <p:nvGrpSpPr>
-        <p:cNvPr id="1" name=""/>
-        <p:cNvGrpSpPr/>
-        <p:nvPr/>
-      </p:nvGrpSpPr>
-      <p:grpSpPr>
-        <a:xfrm>
-          <a:off x="0" y="0"/>
-          <a:ext cx="0" cy="0"/>
-          <a:chOff x="0" y="0"/>
-          <a:chExt cx="0" cy="0"/>
-        </a:xfrm>
-      </p:grpSpPr>
-      <p:sp>
-        <p:nvSpPr>
-          <p:cNvPr id="2" name="Title 1">
-            <a:extLst>
-              <a:ext uri="{FF2B5EF4-FFF2-40B4-BE49-F238E27FC236}">
-                <a16:creationId xmlns:a16="http://schemas.microsoft.com/office/drawing/2014/main" id="{D054733B-0DB2-47AD-967E-8C38D041F3D9}"/>
-              </a:ext>
-            </a:extLst>
-          </p:cNvPr>
-          <p:cNvSpPr>
-            <a:spLocks noGrp="1"/>
-          </p:cNvSpPr>
-          <p:nvPr>
-            <p:ph type="title"/>
-          </p:nvPr>
-        </p:nvSpPr>
-        <p:spPr/>
-        <p:txBody>
-          <a:bodyPr/>
-          <a:lstStyle/>
-          <a:p>
-            <a:pPr algn="ctr"/>
-            <a:r>
-              <a:rPr lang="bg-BG" b="1" i="1" dirty="0"/>
-              <a:t>Основни елементи на нашата система</a:t>
-            </a:r>
-            <a:endParaRPr lang="en-US" b="1" i="1" dirty="0"/>
-          </a:p>
-        </p:txBody>
-      </p:sp>
-      <p:sp>
-        <p:nvSpPr>
-          <p:cNvPr id="3" name="Content Placeholder 2">
-            <a:extLst>
-              <a:ext uri="{FF2B5EF4-FFF2-40B4-BE49-F238E27FC236}">
-                <a16:creationId xmlns:a16="http://schemas.microsoft.com/office/drawing/2014/main" id="{ECBCA525-B230-48AD-A197-36DE2B659B26}"/>
-              </a:ext>
-            </a:extLst>
-          </p:cNvPr>
-          <p:cNvSpPr>
-            <a:spLocks noGrp="1"/>
-          </p:cNvSpPr>
-          <p:nvPr>
-            <p:ph idx="1"/>
-          </p:nvPr>
-        </p:nvSpPr>
-        <p:spPr/>
-        <p:txBody>
-          <a:bodyPr>
-            <a:normAutofit fontScale="92500" lnSpcReduction="20000"/>
-          </a:bodyPr>
-          <a:lstStyle/>
-          <a:p>
-            <a:r>
-              <a:rPr lang="bg-BG" dirty="0"/>
-              <a:t>В основата на системата стоят курсовете(</a:t>
-            </a:r>
-            <a:r>
-              <a:rPr lang="en-US" dirty="0"/>
-              <a:t>Courses</a:t>
-            </a:r>
-            <a:r>
-              <a:rPr lang="bg-BG" dirty="0"/>
-              <a:t>). Всеки курс има уроци(</a:t>
-            </a:r>
-            <a:r>
-              <a:rPr lang="en-US" dirty="0"/>
-              <a:t>Lessons</a:t>
-            </a:r>
-            <a:r>
-              <a:rPr lang="bg-BG" dirty="0"/>
-              <a:t>), а към уроците има ресурси(</a:t>
-            </a:r>
-            <a:r>
-              <a:rPr lang="en-US" dirty="0"/>
-              <a:t>Resources</a:t>
-            </a:r>
-            <a:r>
-              <a:rPr lang="bg-BG" dirty="0"/>
-              <a:t>) за учене. </a:t>
-            </a:r>
-          </a:p>
-          <a:p>
-            <a:r>
-              <a:rPr lang="bg-BG" dirty="0"/>
-              <a:t>В нашата система има задачи(</a:t>
-            </a:r>
-            <a:r>
-              <a:rPr lang="en-US" dirty="0"/>
-              <a:t>Problems)</a:t>
-            </a:r>
-            <a:r>
-              <a:rPr lang="bg-BG" dirty="0"/>
-              <a:t>, които принадлежат към даден </a:t>
-            </a:r>
-            <a:r>
-              <a:rPr lang="bg-BG" dirty="0" smtClean="0"/>
-              <a:t>урок </a:t>
-            </a:r>
-            <a:r>
-              <a:rPr lang="bg-BG" dirty="0"/>
-              <a:t>и имат тестове(</a:t>
-            </a:r>
-            <a:r>
-              <a:rPr lang="en-US" dirty="0"/>
-              <a:t>Tests</a:t>
-            </a:r>
-            <a:r>
-              <a:rPr lang="bg-BG" dirty="0" smtClean="0"/>
-              <a:t>)</a:t>
-            </a:r>
-            <a:r>
-              <a:rPr lang="en-US" dirty="0" smtClean="0"/>
-              <a:t>,</a:t>
-            </a:r>
-            <a:r>
-              <a:rPr lang="bg-BG" dirty="0" smtClean="0"/>
-              <a:t> </a:t>
-            </a:r>
-            <a:r>
-              <a:rPr lang="bg-BG" dirty="0"/>
-              <a:t>и за всяка от задачите потребителите(</a:t>
-            </a:r>
-            <a:r>
-              <a:rPr lang="en-US" dirty="0"/>
-              <a:t>Users</a:t>
-            </a:r>
-            <a:r>
-              <a:rPr lang="bg-BG" dirty="0"/>
-              <a:t>), могат да предават решение(</a:t>
-            </a:r>
-            <a:r>
-              <a:rPr lang="en-US" dirty="0"/>
-              <a:t>Submission</a:t>
-            </a:r>
-            <a:r>
-              <a:rPr lang="bg-BG" dirty="0"/>
-              <a:t>).</a:t>
-            </a:r>
-            <a:endParaRPr lang="en-US" dirty="0"/>
-          </a:p>
-          <a:p>
-            <a:r>
-              <a:rPr lang="bg-BG" dirty="0"/>
-              <a:t>В системата също така има 3 типа потребители – Администратор, Преподавател и Обикновен потребител.</a:t>
-            </a:r>
-          </a:p>
-          <a:p>
-            <a:r>
-              <a:rPr lang="bg-BG" dirty="0"/>
-              <a:t>Друга важна част на системата са изпълнените тестове(</a:t>
-            </a:r>
-            <a:r>
-              <a:rPr lang="en-US" dirty="0" err="1"/>
-              <a:t>ExecutedTests</a:t>
-            </a:r>
-            <a:r>
-              <a:rPr lang="bg-BG" dirty="0"/>
-              <a:t>)</a:t>
-            </a:r>
-            <a:r>
-              <a:rPr lang="en-US" dirty="0"/>
-              <a:t>.</a:t>
-            </a:r>
-          </a:p>
-          <a:p>
-            <a:r>
-              <a:rPr lang="bg-BG" dirty="0"/>
-              <a:t>Имаме и състезания(</a:t>
-            </a:r>
-            <a:r>
-              <a:rPr lang="en-US" dirty="0"/>
-              <a:t>Contests</a:t>
-            </a:r>
-            <a:r>
-              <a:rPr lang="bg-BG" dirty="0"/>
-              <a:t>), които отново принадлежат към даден урок. Във всяко състезание имаме определен набор от разрешени </a:t>
-            </a:r>
-            <a:r>
-              <a:rPr lang="en-US" dirty="0"/>
-              <a:t>IP </a:t>
-            </a:r>
-            <a:r>
-              <a:rPr lang="bg-BG" dirty="0"/>
-              <a:t>адреси(</a:t>
-            </a:r>
-            <a:r>
-              <a:rPr lang="en-US" dirty="0" err="1"/>
-              <a:t>AllowedIpAddresses</a:t>
-            </a:r>
-            <a:r>
-              <a:rPr lang="bg-BG" dirty="0"/>
-              <a:t>). Също така в него могат да участват потребители.</a:t>
-            </a:r>
-            <a:endParaRPr lang="en-US" dirty="0"/>
-          </a:p>
-          <a:p>
-            <a:endParaRPr lang="en-US" dirty="0"/>
-          </a:p>
-        </p:txBody>
-      </p:sp>
-    </p:spTree>
-    <p:extLst>
-      <p:ext uri="{BB962C8B-B14F-4D97-AF65-F5344CB8AC3E}">
-        <p14:creationId xmlns:p14="http://schemas.microsoft.com/office/powerpoint/2010/main" val="1177428441"/>
-      </p:ext>
-    </p:extLst>
-  </p:cSld>
-  <p:clrMapOvr>
-    <a:masterClrMapping/>
-  </p:clrMapOvr>
-</p:sld>
-</file>
-
-<file path=ppt/slides/slide5.xml><?xml version="1.0" encoding="utf-8"?>
 <p:sld xmlns:a="http://schemas.openxmlformats.org/drawingml/2006/main" xmlns:r="http://schemas.openxmlformats.org/officeDocument/2006/relationships" xmlns:p="http://schemas.openxmlformats.org/presentationml/2006/main">
   <p:cSld>
     <p:spTree>
@@ -11502,328 +10141,7 @@
 </p:sld>
 </file>
 
-<file path=ppt/slides/slide6.xml><?xml version="1.0" encoding="utf-8"?>
-<p:sld xmlns:a="http://schemas.openxmlformats.org/drawingml/2006/main" xmlns:r="http://schemas.openxmlformats.org/officeDocument/2006/relationships" xmlns:p="http://schemas.openxmlformats.org/presentationml/2006/main">
-  <p:cSld>
-    <p:spTree>
-      <p:nvGrpSpPr>
-        <p:cNvPr id="1" name=""/>
-        <p:cNvGrpSpPr/>
-        <p:nvPr/>
-      </p:nvGrpSpPr>
-      <p:grpSpPr>
-        <a:xfrm>
-          <a:off x="0" y="0"/>
-          <a:ext cx="0" cy="0"/>
-          <a:chOff x="0" y="0"/>
-          <a:chExt cx="0" cy="0"/>
-        </a:xfrm>
-      </p:grpSpPr>
-      <p:sp>
-        <p:nvSpPr>
-          <p:cNvPr id="2" name="Title 1">
-            <a:extLst>
-              <a:ext uri="{FF2B5EF4-FFF2-40B4-BE49-F238E27FC236}">
-                <a16:creationId xmlns:a16="http://schemas.microsoft.com/office/drawing/2014/main" id="{20D65B34-242D-4A3A-8E20-596EB59E1B98}"/>
-              </a:ext>
-            </a:extLst>
-          </p:cNvPr>
-          <p:cNvSpPr>
-            <a:spLocks noGrp="1"/>
-          </p:cNvSpPr>
-          <p:nvPr>
-            <p:ph type="title"/>
-          </p:nvPr>
-        </p:nvSpPr>
-        <p:spPr/>
-        <p:txBody>
-          <a:bodyPr/>
-          <a:lstStyle/>
-          <a:p>
-            <a:pPr algn="ctr"/>
-            <a:r>
-              <a:rPr lang="bg-BG" b="1" i="1" dirty="0"/>
-              <a:t>Отношения</a:t>
-            </a:r>
-            <a:r>
-              <a:rPr lang="en-US" b="1" i="1" dirty="0"/>
-              <a:t> </a:t>
-            </a:r>
-            <a:r>
-              <a:rPr lang="bg-BG" b="1" i="1" dirty="0"/>
-              <a:t>много към много</a:t>
-            </a:r>
-            <a:endParaRPr lang="en-US" b="1" i="1" dirty="0"/>
-          </a:p>
-        </p:txBody>
-      </p:sp>
-      <p:sp>
-        <p:nvSpPr>
-          <p:cNvPr id="3" name="Content Placeholder 2">
-            <a:extLst>
-              <a:ext uri="{FF2B5EF4-FFF2-40B4-BE49-F238E27FC236}">
-                <a16:creationId xmlns:a16="http://schemas.microsoft.com/office/drawing/2014/main" id="{47271A28-460F-41DC-BA10-5FDBF5551B43}"/>
-              </a:ext>
-            </a:extLst>
-          </p:cNvPr>
-          <p:cNvSpPr>
-            <a:spLocks noGrp="1"/>
-          </p:cNvSpPr>
-          <p:nvPr>
-            <p:ph idx="1"/>
-          </p:nvPr>
-        </p:nvSpPr>
-        <p:spPr/>
-        <p:txBody>
-          <a:bodyPr/>
-          <a:lstStyle/>
-          <a:p>
-            <a:r>
-              <a:rPr lang="en-US" dirty="0"/>
-              <a:t>Users – Contests </a:t>
-            </a:r>
-            <a:r>
-              <a:rPr lang="bg-BG" dirty="0"/>
-              <a:t>(</a:t>
-            </a:r>
-            <a:r>
-              <a:rPr lang="en-US" dirty="0" err="1"/>
-              <a:t>UserContests</a:t>
-            </a:r>
-            <a:r>
-              <a:rPr lang="bg-BG" dirty="0"/>
-              <a:t>)</a:t>
-            </a:r>
-            <a:r>
-              <a:rPr lang="en-US" dirty="0"/>
-              <a:t>, </a:t>
-            </a:r>
-            <a:r>
-              <a:rPr lang="bg-BG" dirty="0"/>
-              <a:t>един потребител може да участва в много състезания и в едно състезание може да участват много потребители.</a:t>
-            </a:r>
-            <a:endParaRPr lang="en-US" dirty="0"/>
-          </a:p>
-          <a:p>
-            <a:r>
-              <a:rPr lang="en-US" dirty="0"/>
-              <a:t>Users – Roles </a:t>
-            </a:r>
-            <a:r>
-              <a:rPr lang="bg-BG" dirty="0"/>
-              <a:t>(</a:t>
-            </a:r>
-            <a:r>
-              <a:rPr lang="en-US" dirty="0" err="1"/>
-              <a:t>UserRoles</a:t>
-            </a:r>
-            <a:r>
-              <a:rPr lang="bg-BG" dirty="0"/>
-              <a:t>), Един потребител може да има различни роли и една роля може да бъде на повече от един потребител.</a:t>
-            </a:r>
-            <a:endParaRPr lang="en-US" dirty="0"/>
-          </a:p>
-          <a:p>
-            <a:r>
-              <a:rPr lang="en-US" dirty="0"/>
-              <a:t>Contests – </a:t>
-            </a:r>
-            <a:r>
-              <a:rPr lang="en-US" dirty="0" err="1"/>
-              <a:t>AllowedIpAddresses</a:t>
-            </a:r>
-            <a:r>
-              <a:rPr lang="en-US" dirty="0"/>
-              <a:t> </a:t>
-            </a:r>
-            <a:r>
-              <a:rPr lang="bg-BG" dirty="0"/>
-              <a:t>(</a:t>
-            </a:r>
-            <a:r>
-              <a:rPr lang="en-US" dirty="0" err="1"/>
-              <a:t>ContestAllowedIpAddresses</a:t>
-            </a:r>
-            <a:r>
-              <a:rPr lang="bg-BG" dirty="0"/>
-              <a:t>), едно състезание може да има много разрешени адреси и на един разрешен адрес могат да се водят много състезания.</a:t>
-            </a:r>
-            <a:endParaRPr lang="en-US" dirty="0"/>
-          </a:p>
-        </p:txBody>
-      </p:sp>
-    </p:spTree>
-    <p:extLst>
-      <p:ext uri="{BB962C8B-B14F-4D97-AF65-F5344CB8AC3E}">
-        <p14:creationId xmlns:p14="http://schemas.microsoft.com/office/powerpoint/2010/main" val="2480036580"/>
-      </p:ext>
-    </p:extLst>
-  </p:cSld>
-  <p:clrMapOvr>
-    <a:masterClrMapping/>
-  </p:clrMapOvr>
-</p:sld>
-</file>
-
-<file path=ppt/slides/slide7.xml><?xml version="1.0" encoding="utf-8"?>
-<p:sld xmlns:a="http://schemas.openxmlformats.org/drawingml/2006/main" xmlns:r="http://schemas.openxmlformats.org/officeDocument/2006/relationships" xmlns:p="http://schemas.openxmlformats.org/presentationml/2006/main">
-  <p:cSld>
-    <p:spTree>
-      <p:nvGrpSpPr>
-        <p:cNvPr id="1" name=""/>
-        <p:cNvGrpSpPr/>
-        <p:nvPr/>
-      </p:nvGrpSpPr>
-      <p:grpSpPr>
-        <a:xfrm>
-          <a:off x="0" y="0"/>
-          <a:ext cx="0" cy="0"/>
-          <a:chOff x="0" y="0"/>
-          <a:chExt cx="0" cy="0"/>
-        </a:xfrm>
-      </p:grpSpPr>
-      <p:sp>
-        <p:nvSpPr>
-          <p:cNvPr id="2" name="Title 1">
-            <a:extLst>
-              <a:ext uri="{FF2B5EF4-FFF2-40B4-BE49-F238E27FC236}">
-                <a16:creationId xmlns:a16="http://schemas.microsoft.com/office/drawing/2014/main" id="{4F5204F9-98EA-4ED0-B9AD-7631FC451A97}"/>
-              </a:ext>
-            </a:extLst>
-          </p:cNvPr>
-          <p:cNvSpPr>
-            <a:spLocks noGrp="1"/>
-          </p:cNvSpPr>
-          <p:nvPr>
-            <p:ph type="title"/>
-          </p:nvPr>
-        </p:nvSpPr>
-        <p:spPr/>
-        <p:txBody>
-          <a:bodyPr/>
-          <a:lstStyle/>
-          <a:p>
-            <a:pPr algn="ctr"/>
-            <a:r>
-              <a:rPr lang="bg-BG" b="1" i="1" dirty="0"/>
-              <a:t>Отношения едно към много</a:t>
-            </a:r>
-            <a:endParaRPr lang="en-US" b="1" i="1" dirty="0"/>
-          </a:p>
-        </p:txBody>
-      </p:sp>
-      <p:sp>
-        <p:nvSpPr>
-          <p:cNvPr id="3" name="Content Placeholder 2">
-            <a:extLst>
-              <a:ext uri="{FF2B5EF4-FFF2-40B4-BE49-F238E27FC236}">
-                <a16:creationId xmlns:a16="http://schemas.microsoft.com/office/drawing/2014/main" id="{45F30B96-81CE-46FD-B2D4-7ABB6A19C95A}"/>
-              </a:ext>
-            </a:extLst>
-          </p:cNvPr>
-          <p:cNvSpPr>
-            <a:spLocks noGrp="1"/>
-          </p:cNvSpPr>
-          <p:nvPr>
-            <p:ph idx="1"/>
-          </p:nvPr>
-        </p:nvSpPr>
-        <p:spPr/>
-        <p:txBody>
-          <a:bodyPr>
-            <a:normAutofit fontScale="92500" lnSpcReduction="10000"/>
-          </a:bodyPr>
-          <a:lstStyle/>
-          <a:p>
-            <a:r>
-              <a:rPr lang="en-US" dirty="0"/>
-              <a:t>Users – Submissions, </a:t>
-            </a:r>
-            <a:r>
-              <a:rPr lang="bg-BG" dirty="0"/>
-              <a:t>един потребител може да предава много решения, но всяко решение принадлежи на 1 потребител.</a:t>
-            </a:r>
-          </a:p>
-          <a:p>
-            <a:r>
-              <a:rPr lang="en-US" dirty="0"/>
-              <a:t>Problems – Submissions</a:t>
-            </a:r>
-          </a:p>
-          <a:p>
-            <a:r>
-              <a:rPr lang="en-US" dirty="0"/>
-              <a:t>Lessons – Problems</a:t>
-            </a:r>
-          </a:p>
-          <a:p>
-            <a:r>
-              <a:rPr lang="en-US" dirty="0"/>
-              <a:t>Courses – Lessons</a:t>
-            </a:r>
-          </a:p>
-          <a:p>
-            <a:r>
-              <a:rPr lang="en-US" dirty="0"/>
-              <a:t>Lessons – Resources</a:t>
-            </a:r>
-          </a:p>
-          <a:p>
-            <a:r>
-              <a:rPr lang="en-US" dirty="0"/>
-              <a:t>Problems – Tests</a:t>
-            </a:r>
-          </a:p>
-          <a:p>
-            <a:r>
-              <a:rPr lang="en-US" dirty="0"/>
-              <a:t>Tests – </a:t>
-            </a:r>
-            <a:r>
-              <a:rPr lang="en-US" dirty="0" err="1"/>
-              <a:t>ExecutedTests</a:t>
-            </a:r>
-            <a:endParaRPr lang="en-US" dirty="0"/>
-          </a:p>
-          <a:p>
-            <a:r>
-              <a:rPr lang="en-US" dirty="0"/>
-              <a:t>Submission – </a:t>
-            </a:r>
-            <a:r>
-              <a:rPr lang="en-US" dirty="0" err="1"/>
-              <a:t>ExecutedTests</a:t>
-            </a:r>
-            <a:endParaRPr lang="en-US" dirty="0"/>
-          </a:p>
-          <a:p>
-            <a:r>
-              <a:rPr lang="en-US" dirty="0"/>
-              <a:t>Lessons - Contests</a:t>
-            </a:r>
-          </a:p>
-          <a:p>
-            <a:endParaRPr lang="en-US" dirty="0"/>
-          </a:p>
-          <a:p>
-            <a:endParaRPr lang="en-US" dirty="0"/>
-          </a:p>
-        </p:txBody>
-      </p:sp>
-    </p:spTree>
-    <p:extLst>
-      <p:ext uri="{BB962C8B-B14F-4D97-AF65-F5344CB8AC3E}">
-        <p14:creationId xmlns:p14="http://schemas.microsoft.com/office/powerpoint/2010/main" val="3750764900"/>
-      </p:ext>
-    </p:extLst>
-  </p:cSld>
-  <p:clrMapOvr>
-    <a:masterClrMapping/>
-  </p:clrMapOvr>
-</p:sld>
-</file>
-
-<file path=ppt/slides/slide8.xml><?xml version="1.0" encoding="utf-8"?>
+<file path=ppt/slides/slide5.xml><?xml version="1.0" encoding="utf-8"?>
 <p:sld xmlns:a="http://schemas.openxmlformats.org/drawingml/2006/main" xmlns:r="http://schemas.openxmlformats.org/officeDocument/2006/relationships" xmlns:p="http://schemas.openxmlformats.org/presentationml/2006/main">
   <p:cSld>
     <p:spTree>
@@ -12242,7 +10560,7 @@
 </p:sld>
 </file>
 
-<file path=ppt/slides/slide9.xml><?xml version="1.0" encoding="utf-8"?>
+<file path=ppt/slides/slide6.xml><?xml version="1.0" encoding="utf-8"?>
 <p:sld xmlns:a="http://schemas.openxmlformats.org/drawingml/2006/main" xmlns:r="http://schemas.openxmlformats.org/officeDocument/2006/relationships" xmlns:p="http://schemas.openxmlformats.org/presentationml/2006/main">
   <p:cSld>
     <p:spTree>
@@ -12432,6 +10750,1327 @@
     <p:extLst>
       <p:ext uri="{BB962C8B-B14F-4D97-AF65-F5344CB8AC3E}">
         <p14:creationId xmlns:p14="http://schemas.microsoft.com/office/powerpoint/2010/main" val="4148823631"/>
+      </p:ext>
+    </p:extLst>
+  </p:cSld>
+  <p:clrMapOvr>
+    <a:masterClrMapping/>
+  </p:clrMapOvr>
+</p:sld>
+</file>
+
+<file path=ppt/slides/slide7.xml><?xml version="1.0" encoding="utf-8"?>
+<p:sld xmlns:a="http://schemas.openxmlformats.org/drawingml/2006/main" xmlns:r="http://schemas.openxmlformats.org/officeDocument/2006/relationships" xmlns:p="http://schemas.openxmlformats.org/presentationml/2006/main">
+  <p:cSld>
+    <p:spTree>
+      <p:nvGrpSpPr>
+        <p:cNvPr id="1" name=""/>
+        <p:cNvGrpSpPr/>
+        <p:nvPr/>
+      </p:nvGrpSpPr>
+      <p:grpSpPr>
+        <a:xfrm>
+          <a:off x="0" y="0"/>
+          <a:ext cx="0" cy="0"/>
+          <a:chOff x="0" y="0"/>
+          <a:chExt cx="0" cy="0"/>
+        </a:xfrm>
+      </p:grpSpPr>
+      <p:sp>
+        <p:nvSpPr>
+          <p:cNvPr id="2" name="Title 1">
+            <a:extLst>
+              <a:ext uri="{FF2B5EF4-FFF2-40B4-BE49-F238E27FC236}">
+                <a16:creationId xmlns:a16="http://schemas.microsoft.com/office/drawing/2014/main" id="{88AF85A5-FE9C-A3BA-D307-322170E8369D}"/>
+              </a:ext>
+            </a:extLst>
+          </p:cNvPr>
+          <p:cNvSpPr>
+            <a:spLocks noGrp="1"/>
+          </p:cNvSpPr>
+          <p:nvPr>
+            <p:ph type="title"/>
+          </p:nvPr>
+        </p:nvSpPr>
+        <p:spPr/>
+        <p:txBody>
+          <a:bodyPr/>
+          <a:lstStyle/>
+          <a:p>
+            <a:r>
+              <a:rPr lang="en-US" b="1" i="1" dirty="0" err="1">
+                <a:cs typeface="Calibri Light"/>
+              </a:rPr>
+              <a:t>Прости</a:t>
+            </a:r>
+            <a:r>
+              <a:rPr lang="en-US" b="1" i="1" dirty="0">
+                <a:cs typeface="Calibri Light"/>
+              </a:rPr>
+              <a:t> </a:t>
+            </a:r>
+            <a:r>
+              <a:rPr lang="en-US" b="1" i="1" dirty="0" err="1">
+                <a:cs typeface="Calibri Light"/>
+              </a:rPr>
+              <a:t>заявки</a:t>
+            </a:r>
+            <a:endParaRPr lang="en-US" b="1" i="1" dirty="0" err="1"/>
+          </a:p>
+        </p:txBody>
+      </p:sp>
+      <p:sp>
+        <p:nvSpPr>
+          <p:cNvPr id="7" name="Текстово поле 6">
+            <a:extLst>
+              <a:ext uri="{FF2B5EF4-FFF2-40B4-BE49-F238E27FC236}">
+                <a16:creationId xmlns:a16="http://schemas.microsoft.com/office/drawing/2014/main" id="{AF9A2533-D927-849D-DEE3-B9EF90E1D87D}"/>
+              </a:ext>
+            </a:extLst>
+          </p:cNvPr>
+          <p:cNvSpPr txBox="1"/>
+          <p:nvPr/>
+        </p:nvSpPr>
+        <p:spPr>
+          <a:xfrm>
+            <a:off x="838200" y="1590020"/>
+            <a:ext cx="8380603" cy="4401205"/>
+          </a:xfrm>
+          <a:prstGeom prst="rect">
+            <a:avLst/>
+          </a:prstGeom>
+          <a:noFill/>
+        </p:spPr>
+        <p:txBody>
+          <a:bodyPr wrap="square" rtlCol="0">
+            <a:spAutoFit/>
+          </a:bodyPr>
+          <a:lstStyle/>
+          <a:p>
+            <a:r>
+              <a:rPr lang="en-US" sz="4000" dirty="0">
+                <a:solidFill>
+                  <a:srgbClr val="FF0000"/>
+                </a:solidFill>
+                <a:latin typeface="Algerian" panose="04020705040A02060702" pitchFamily="82" charset="0"/>
+              </a:rPr>
+              <a:t>SELECT</a:t>
+            </a:r>
+            <a:r>
+              <a:rPr lang="en-US" sz="4000" dirty="0">
+                <a:latin typeface="Algerian" panose="04020705040A02060702" pitchFamily="82" charset="0"/>
+              </a:rPr>
+              <a:t> *</a:t>
+            </a:r>
+          </a:p>
+          <a:p>
+            <a:r>
+              <a:rPr lang="en-US" sz="4000" dirty="0">
+                <a:solidFill>
+                  <a:srgbClr val="FF0000"/>
+                </a:solidFill>
+                <a:latin typeface="Algerian" panose="04020705040A02060702" pitchFamily="82" charset="0"/>
+              </a:rPr>
+              <a:t>FROM</a:t>
+            </a:r>
+            <a:r>
+              <a:rPr lang="en-US" sz="4000" dirty="0">
+                <a:latin typeface="Algerian" panose="04020705040A02060702" pitchFamily="82" charset="0"/>
+              </a:rPr>
+              <a:t> Tests</a:t>
+            </a:r>
+          </a:p>
+          <a:p>
+            <a:r>
+              <a:rPr lang="en-US" sz="4000" dirty="0">
+                <a:solidFill>
+                  <a:srgbClr val="FF0000"/>
+                </a:solidFill>
+                <a:latin typeface="Algerian" panose="04020705040A02060702" pitchFamily="82" charset="0"/>
+              </a:rPr>
+              <a:t>WHERE</a:t>
+            </a:r>
+            <a:r>
+              <a:rPr lang="en-US" sz="4000" dirty="0">
+                <a:latin typeface="Algerian" panose="04020705040A02060702" pitchFamily="82" charset="0"/>
+              </a:rPr>
+              <a:t> </a:t>
+            </a:r>
+            <a:r>
+              <a:rPr lang="en-US" sz="4000" dirty="0" err="1">
+                <a:latin typeface="Algerian" panose="04020705040A02060702" pitchFamily="82" charset="0"/>
+              </a:rPr>
+              <a:t>ProblemId</a:t>
+            </a:r>
+            <a:r>
+              <a:rPr lang="en-US" sz="4000" dirty="0">
+                <a:latin typeface="Algerian" panose="04020705040A02060702" pitchFamily="82" charset="0"/>
+              </a:rPr>
+              <a:t> = 1;</a:t>
+            </a:r>
+          </a:p>
+          <a:p>
+            <a:r>
+              <a:rPr lang="en-US" sz="4000" dirty="0">
+                <a:solidFill>
+                  <a:srgbClr val="FF0000"/>
+                </a:solidFill>
+                <a:latin typeface="Algerian" panose="04020705040A02060702" pitchFamily="82" charset="0"/>
+              </a:rPr>
+              <a:t>SELECT</a:t>
+            </a:r>
+            <a:r>
+              <a:rPr lang="en-US" sz="4000" dirty="0">
+                <a:latin typeface="Algerian" panose="04020705040A02060702" pitchFamily="82" charset="0"/>
+              </a:rPr>
+              <a:t> * </a:t>
+            </a:r>
+          </a:p>
+          <a:p>
+            <a:r>
+              <a:rPr lang="en-US" sz="4000" dirty="0">
+                <a:solidFill>
+                  <a:srgbClr val="FF0000"/>
+                </a:solidFill>
+                <a:latin typeface="Algerian" panose="04020705040A02060702" pitchFamily="82" charset="0"/>
+              </a:rPr>
+              <a:t>FROM</a:t>
+            </a:r>
+            <a:r>
+              <a:rPr lang="en-US" sz="4000" dirty="0">
+                <a:latin typeface="Algerian" panose="04020705040A02060702" pitchFamily="82" charset="0"/>
+              </a:rPr>
+              <a:t> Contests</a:t>
+            </a:r>
+          </a:p>
+          <a:p>
+            <a:r>
+              <a:rPr lang="en-US" sz="4000" dirty="0">
+                <a:solidFill>
+                  <a:srgbClr val="FF0000"/>
+                </a:solidFill>
+                <a:latin typeface="Algerian" panose="04020705040A02060702" pitchFamily="82" charset="0"/>
+              </a:rPr>
+              <a:t>WHERE</a:t>
+            </a:r>
+            <a:r>
+              <a:rPr lang="en-US" sz="4000" dirty="0">
+                <a:latin typeface="Algerian" panose="04020705040A02060702" pitchFamily="82" charset="0"/>
+              </a:rPr>
+              <a:t> GETDATE</a:t>
+            </a:r>
+            <a:r>
+              <a:rPr lang="en-US" sz="4000" dirty="0">
+                <a:solidFill>
+                  <a:srgbClr val="FFC000"/>
+                </a:solidFill>
+                <a:latin typeface="Algerian" panose="04020705040A02060702" pitchFamily="82" charset="0"/>
+              </a:rPr>
+              <a:t>()</a:t>
+            </a:r>
+            <a:r>
+              <a:rPr lang="en-US" sz="4000" dirty="0">
+                <a:latin typeface="Algerian" panose="04020705040A02060702" pitchFamily="82" charset="0"/>
+              </a:rPr>
+              <a:t> </a:t>
+            </a:r>
+            <a:r>
+              <a:rPr lang="en-US" sz="4000" dirty="0">
+                <a:solidFill>
+                  <a:srgbClr val="FF0000"/>
+                </a:solidFill>
+                <a:latin typeface="Algerian" panose="04020705040A02060702" pitchFamily="82" charset="0"/>
+              </a:rPr>
+              <a:t>BETWEEN</a:t>
+            </a:r>
+            <a:r>
+              <a:rPr lang="en-US" sz="4000" dirty="0">
+                <a:latin typeface="Algerian" panose="04020705040A02060702" pitchFamily="82" charset="0"/>
+              </a:rPr>
+              <a:t> </a:t>
+            </a:r>
+            <a:r>
+              <a:rPr lang="en-US" sz="4000" dirty="0" err="1">
+                <a:latin typeface="Algerian" panose="04020705040A02060702" pitchFamily="82" charset="0"/>
+              </a:rPr>
+              <a:t>StartTime</a:t>
+            </a:r>
+            <a:r>
+              <a:rPr lang="en-US" sz="4000" dirty="0">
+                <a:latin typeface="Algerian" panose="04020705040A02060702" pitchFamily="82" charset="0"/>
+              </a:rPr>
+              <a:t> </a:t>
+            </a:r>
+            <a:r>
+              <a:rPr lang="en-US" sz="4000" dirty="0">
+                <a:solidFill>
+                  <a:srgbClr val="FF0000"/>
+                </a:solidFill>
+                <a:latin typeface="Algerian" panose="04020705040A02060702" pitchFamily="82" charset="0"/>
+              </a:rPr>
+              <a:t>AND</a:t>
+            </a:r>
+            <a:r>
+              <a:rPr lang="en-US" sz="4000" dirty="0">
+                <a:latin typeface="Algerian" panose="04020705040A02060702" pitchFamily="82" charset="0"/>
+              </a:rPr>
+              <a:t> </a:t>
+            </a:r>
+            <a:r>
+              <a:rPr lang="en-US" sz="4000" dirty="0" err="1">
+                <a:latin typeface="Algerian" panose="04020705040A02060702" pitchFamily="82" charset="0"/>
+              </a:rPr>
+              <a:t>EndTime</a:t>
+            </a:r>
+            <a:r>
+              <a:rPr lang="en-US" sz="4000" dirty="0">
+                <a:latin typeface="Algerian" panose="04020705040A02060702" pitchFamily="82" charset="0"/>
+              </a:rPr>
+              <a:t>;</a:t>
+            </a:r>
+          </a:p>
+        </p:txBody>
+      </p:sp>
+    </p:spTree>
+    <p:extLst>
+      <p:ext uri="{BB962C8B-B14F-4D97-AF65-F5344CB8AC3E}">
+        <p14:creationId xmlns:p14="http://schemas.microsoft.com/office/powerpoint/2010/main" val="1209971532"/>
+      </p:ext>
+    </p:extLst>
+  </p:cSld>
+  <p:clrMapOvr>
+    <a:masterClrMapping/>
+  </p:clrMapOvr>
+</p:sld>
+</file>
+
+<file path=ppt/slides/slide8.xml><?xml version="1.0" encoding="utf-8"?>
+<p:sld xmlns:a="http://schemas.openxmlformats.org/drawingml/2006/main" xmlns:r="http://schemas.openxmlformats.org/officeDocument/2006/relationships" xmlns:p="http://schemas.openxmlformats.org/presentationml/2006/main">
+  <p:cSld>
+    <p:spTree>
+      <p:nvGrpSpPr>
+        <p:cNvPr id="1" name=""/>
+        <p:cNvGrpSpPr/>
+        <p:nvPr/>
+      </p:nvGrpSpPr>
+      <p:grpSpPr>
+        <a:xfrm>
+          <a:off x="0" y="0"/>
+          <a:ext cx="0" cy="0"/>
+          <a:chOff x="0" y="0"/>
+          <a:chExt cx="0" cy="0"/>
+        </a:xfrm>
+      </p:grpSpPr>
+      <p:sp>
+        <p:nvSpPr>
+          <p:cNvPr id="2" name="Title 1">
+            <a:extLst>
+              <a:ext uri="{FF2B5EF4-FFF2-40B4-BE49-F238E27FC236}">
+                <a16:creationId xmlns:a16="http://schemas.microsoft.com/office/drawing/2014/main" id="{77D6D8B1-8147-CB5F-37E1-36470B474523}"/>
+              </a:ext>
+            </a:extLst>
+          </p:cNvPr>
+          <p:cNvSpPr>
+            <a:spLocks noGrp="1"/>
+          </p:cNvSpPr>
+          <p:nvPr>
+            <p:ph type="title"/>
+          </p:nvPr>
+        </p:nvSpPr>
+        <p:spPr/>
+        <p:txBody>
+          <a:bodyPr/>
+          <a:lstStyle/>
+          <a:p>
+            <a:r>
+              <a:rPr lang="en-US" b="1" i="1" dirty="0" err="1">
+                <a:cs typeface="Calibri Light"/>
+              </a:rPr>
+              <a:t>Заявки</a:t>
+            </a:r>
+            <a:r>
+              <a:rPr lang="en-US" b="1" i="1" dirty="0">
+                <a:cs typeface="Calibri Light"/>
+              </a:rPr>
+              <a:t> </a:t>
+            </a:r>
+            <a:r>
+              <a:rPr lang="en-US" b="1" i="1" dirty="0" err="1">
+                <a:cs typeface="Calibri Light"/>
+              </a:rPr>
+              <a:t>върху</a:t>
+            </a:r>
+            <a:r>
+              <a:rPr lang="en-US" b="1" i="1" dirty="0">
+                <a:cs typeface="Calibri Light"/>
+              </a:rPr>
+              <a:t> 2 и </a:t>
+            </a:r>
+            <a:r>
+              <a:rPr lang="en-US" b="1" i="1" dirty="0" err="1">
+                <a:cs typeface="Calibri Light"/>
+              </a:rPr>
+              <a:t>повече</a:t>
+            </a:r>
+            <a:r>
+              <a:rPr lang="en-US" b="1" i="1" dirty="0">
+                <a:cs typeface="Calibri Light"/>
+              </a:rPr>
+              <a:t> </a:t>
+            </a:r>
+            <a:r>
+              <a:rPr lang="en-US" b="1" i="1" dirty="0" err="1">
+                <a:cs typeface="Calibri Light"/>
+              </a:rPr>
+              <a:t>релации</a:t>
+            </a:r>
+            <a:endParaRPr lang="en-US" b="1" i="1" dirty="0" err="1"/>
+          </a:p>
+        </p:txBody>
+      </p:sp>
+      <p:sp>
+        <p:nvSpPr>
+          <p:cNvPr id="4" name="Текстово поле 3">
+            <a:extLst>
+              <a:ext uri="{FF2B5EF4-FFF2-40B4-BE49-F238E27FC236}">
+                <a16:creationId xmlns:a16="http://schemas.microsoft.com/office/drawing/2014/main" id="{F81F64DD-F479-73DF-7C7B-E26952DD5FE0}"/>
+              </a:ext>
+            </a:extLst>
+          </p:cNvPr>
+          <p:cNvSpPr txBox="1"/>
+          <p:nvPr/>
+        </p:nvSpPr>
+        <p:spPr>
+          <a:xfrm>
+            <a:off x="265651" y="2178283"/>
+            <a:ext cx="11660697" cy="2308324"/>
+          </a:xfrm>
+          <a:prstGeom prst="rect">
+            <a:avLst/>
+          </a:prstGeom>
+          <a:noFill/>
+        </p:spPr>
+        <p:txBody>
+          <a:bodyPr wrap="square" rtlCol="0">
+            <a:spAutoFit/>
+          </a:bodyPr>
+          <a:lstStyle/>
+          <a:p>
+            <a:r>
+              <a:rPr lang="en-US" dirty="0">
+                <a:solidFill>
+                  <a:srgbClr val="FF0000"/>
+                </a:solidFill>
+                <a:latin typeface="Algerian" panose="04020705040A02060702" pitchFamily="82" charset="0"/>
+              </a:rPr>
+              <a:t>SELECT</a:t>
+            </a:r>
+            <a:r>
+              <a:rPr lang="en-US" dirty="0">
+                <a:latin typeface="Algerian" panose="04020705040A02060702" pitchFamily="82" charset="0"/>
+              </a:rPr>
+              <a:t> </a:t>
+            </a:r>
+            <a:r>
+              <a:rPr lang="en-US" dirty="0" err="1">
+                <a:latin typeface="Algerian" panose="04020705040A02060702" pitchFamily="82" charset="0"/>
+              </a:rPr>
+              <a:t>Problems.Name</a:t>
+            </a:r>
+            <a:r>
+              <a:rPr lang="en-US" dirty="0">
+                <a:latin typeface="Algerian" panose="04020705040A02060702" pitchFamily="82" charset="0"/>
+              </a:rPr>
+              <a:t> as </a:t>
+            </a:r>
+            <a:r>
+              <a:rPr lang="en-US" dirty="0">
+                <a:solidFill>
+                  <a:srgbClr val="FFC000"/>
+                </a:solidFill>
+                <a:latin typeface="Algerian" panose="04020705040A02060702" pitchFamily="82" charset="0"/>
+              </a:rPr>
+              <a:t>[Problem Name]</a:t>
+            </a:r>
+            <a:r>
+              <a:rPr lang="en-US" dirty="0">
+                <a:latin typeface="Algerian" panose="04020705040A02060702" pitchFamily="82" charset="0"/>
+              </a:rPr>
+              <a:t>, </a:t>
+            </a:r>
+            <a:r>
+              <a:rPr lang="en-US" dirty="0" err="1">
+                <a:latin typeface="Algerian" panose="04020705040A02060702" pitchFamily="82" charset="0"/>
+              </a:rPr>
+              <a:t>Tests.Id</a:t>
+            </a:r>
+            <a:r>
+              <a:rPr lang="en-US" dirty="0">
+                <a:latin typeface="Algerian" panose="04020705040A02060702" pitchFamily="82" charset="0"/>
+              </a:rPr>
+              <a:t> </a:t>
+            </a:r>
+            <a:r>
+              <a:rPr lang="en-US" dirty="0">
+                <a:solidFill>
+                  <a:srgbClr val="FF0000"/>
+                </a:solidFill>
+                <a:latin typeface="Algerian" panose="04020705040A02060702" pitchFamily="82" charset="0"/>
+              </a:rPr>
+              <a:t>AS</a:t>
+            </a:r>
+            <a:r>
+              <a:rPr lang="en-US" dirty="0">
+                <a:latin typeface="Algerian" panose="04020705040A02060702" pitchFamily="82" charset="0"/>
+              </a:rPr>
+              <a:t> </a:t>
+            </a:r>
+            <a:r>
+              <a:rPr lang="en-US" dirty="0">
+                <a:solidFill>
+                  <a:srgbClr val="FFC000"/>
+                </a:solidFill>
+                <a:latin typeface="Algerian" panose="04020705040A02060702" pitchFamily="82" charset="0"/>
+              </a:rPr>
+              <a:t>[Test ID]</a:t>
+            </a:r>
+            <a:r>
+              <a:rPr lang="en-US" dirty="0">
+                <a:latin typeface="Algerian" panose="04020705040A02060702" pitchFamily="82" charset="0"/>
+              </a:rPr>
+              <a:t>, </a:t>
+            </a:r>
+            <a:r>
+              <a:rPr lang="en-US" dirty="0" err="1">
+                <a:latin typeface="Algerian" panose="04020705040A02060702" pitchFamily="82" charset="0"/>
+              </a:rPr>
+              <a:t>ExecutedTests.Output</a:t>
+            </a:r>
+            <a:r>
+              <a:rPr lang="en-US" dirty="0">
+                <a:latin typeface="Algerian" panose="04020705040A02060702" pitchFamily="82" charset="0"/>
+              </a:rPr>
+              <a:t>, </a:t>
+            </a:r>
+            <a:r>
+              <a:rPr lang="en-US" dirty="0" err="1">
+                <a:latin typeface="Algerian" panose="04020705040A02060702" pitchFamily="82" charset="0"/>
+              </a:rPr>
+              <a:t>Tests.ExpectedOutput</a:t>
+            </a:r>
+            <a:r>
+              <a:rPr lang="en-US" dirty="0">
+                <a:latin typeface="Algerian" panose="04020705040A02060702" pitchFamily="82" charset="0"/>
+              </a:rPr>
+              <a:t>, </a:t>
+            </a:r>
+            <a:r>
+              <a:rPr lang="en-US" dirty="0">
+                <a:solidFill>
+                  <a:srgbClr val="FF0000"/>
+                </a:solidFill>
+                <a:latin typeface="Algerian" panose="04020705040A02060702" pitchFamily="82" charset="0"/>
+              </a:rPr>
+              <a:t>CASE</a:t>
+            </a:r>
+            <a:r>
+              <a:rPr lang="en-US" dirty="0">
+                <a:latin typeface="Algerian" panose="04020705040A02060702" pitchFamily="82" charset="0"/>
+              </a:rPr>
+              <a:t> </a:t>
+            </a:r>
+          </a:p>
+          <a:p>
+            <a:r>
+              <a:rPr lang="en-US" dirty="0">
+                <a:latin typeface="Algerian" panose="04020705040A02060702" pitchFamily="82" charset="0"/>
+              </a:rPr>
+              <a:t>	</a:t>
+            </a:r>
+            <a:r>
+              <a:rPr lang="en-US" dirty="0">
+                <a:solidFill>
+                  <a:srgbClr val="FF0000"/>
+                </a:solidFill>
+                <a:latin typeface="Algerian" panose="04020705040A02060702" pitchFamily="82" charset="0"/>
+              </a:rPr>
+              <a:t>WHEN</a:t>
+            </a:r>
+            <a:r>
+              <a:rPr lang="en-US" dirty="0">
+                <a:latin typeface="Algerian" panose="04020705040A02060702" pitchFamily="82" charset="0"/>
+              </a:rPr>
+              <a:t> </a:t>
+            </a:r>
+            <a:r>
+              <a:rPr lang="en-US" dirty="0" err="1">
+                <a:latin typeface="Algerian" panose="04020705040A02060702" pitchFamily="82" charset="0"/>
+              </a:rPr>
+              <a:t>ExecutedTests.Output</a:t>
+            </a:r>
+            <a:r>
+              <a:rPr lang="en-US" dirty="0">
+                <a:latin typeface="Algerian" panose="04020705040A02060702" pitchFamily="82" charset="0"/>
+              </a:rPr>
+              <a:t> = </a:t>
+            </a:r>
+            <a:r>
+              <a:rPr lang="en-US" dirty="0" err="1">
+                <a:latin typeface="Algerian" panose="04020705040A02060702" pitchFamily="82" charset="0"/>
+              </a:rPr>
+              <a:t>Tests.ExpectedOutput</a:t>
+            </a:r>
+            <a:endParaRPr lang="en-US" dirty="0">
+              <a:latin typeface="Algerian" panose="04020705040A02060702" pitchFamily="82" charset="0"/>
+            </a:endParaRPr>
+          </a:p>
+          <a:p>
+            <a:r>
+              <a:rPr lang="en-US" dirty="0">
+                <a:latin typeface="Algerian" panose="04020705040A02060702" pitchFamily="82" charset="0"/>
+              </a:rPr>
+              <a:t>		</a:t>
+            </a:r>
+            <a:r>
+              <a:rPr lang="en-US" dirty="0">
+                <a:solidFill>
+                  <a:srgbClr val="FF0000"/>
+                </a:solidFill>
+                <a:latin typeface="Algerian" panose="04020705040A02060702" pitchFamily="82" charset="0"/>
+              </a:rPr>
+              <a:t>THEN</a:t>
+            </a:r>
+            <a:r>
+              <a:rPr lang="en-US" dirty="0">
+                <a:latin typeface="Algerian" panose="04020705040A02060702" pitchFamily="82" charset="0"/>
+              </a:rPr>
+              <a:t> 'Yes'</a:t>
+            </a:r>
+          </a:p>
+          <a:p>
+            <a:r>
+              <a:rPr lang="en-US" dirty="0">
+                <a:latin typeface="Algerian" panose="04020705040A02060702" pitchFamily="82" charset="0"/>
+              </a:rPr>
+              <a:t>		</a:t>
+            </a:r>
+            <a:r>
+              <a:rPr lang="en-US" dirty="0">
+                <a:solidFill>
+                  <a:srgbClr val="FF0000"/>
+                </a:solidFill>
+                <a:latin typeface="Algerian" panose="04020705040A02060702" pitchFamily="82" charset="0"/>
+              </a:rPr>
+              <a:t>ELSE</a:t>
+            </a:r>
+            <a:r>
+              <a:rPr lang="en-US" dirty="0">
+                <a:latin typeface="Algerian" panose="04020705040A02060702" pitchFamily="82" charset="0"/>
+              </a:rPr>
+              <a:t> 'No'</a:t>
+            </a:r>
+          </a:p>
+          <a:p>
+            <a:r>
+              <a:rPr lang="en-US" dirty="0">
+                <a:latin typeface="Algerian" panose="04020705040A02060702" pitchFamily="82" charset="0"/>
+              </a:rPr>
+              <a:t>	</a:t>
+            </a:r>
+            <a:r>
+              <a:rPr lang="en-US" dirty="0">
+                <a:solidFill>
+                  <a:srgbClr val="FF0000"/>
+                </a:solidFill>
+                <a:latin typeface="Algerian" panose="04020705040A02060702" pitchFamily="82" charset="0"/>
+              </a:rPr>
+              <a:t>END</a:t>
+            </a:r>
+            <a:r>
+              <a:rPr lang="en-US" dirty="0">
+                <a:latin typeface="Algerian" panose="04020705040A02060702" pitchFamily="82" charset="0"/>
+              </a:rPr>
+              <a:t> </a:t>
+            </a:r>
+            <a:r>
+              <a:rPr lang="en-US" dirty="0">
+                <a:solidFill>
+                  <a:srgbClr val="FF0000"/>
+                </a:solidFill>
+                <a:latin typeface="Algerian" panose="04020705040A02060702" pitchFamily="82" charset="0"/>
+              </a:rPr>
+              <a:t>AS</a:t>
+            </a:r>
+            <a:r>
+              <a:rPr lang="en-US" dirty="0">
+                <a:latin typeface="Algerian" panose="04020705040A02060702" pitchFamily="82" charset="0"/>
+              </a:rPr>
+              <a:t> [Correct Output] </a:t>
+            </a:r>
+          </a:p>
+          <a:p>
+            <a:r>
+              <a:rPr lang="en-US" dirty="0">
+                <a:solidFill>
+                  <a:srgbClr val="FF0000"/>
+                </a:solidFill>
+                <a:latin typeface="Algerian" panose="04020705040A02060702" pitchFamily="82" charset="0"/>
+              </a:rPr>
+              <a:t>FROM</a:t>
+            </a:r>
+            <a:r>
+              <a:rPr lang="en-US" dirty="0">
+                <a:latin typeface="Algerian" panose="04020705040A02060702" pitchFamily="82" charset="0"/>
+              </a:rPr>
+              <a:t> Tests, </a:t>
+            </a:r>
+            <a:r>
+              <a:rPr lang="en-US" dirty="0" err="1">
+                <a:latin typeface="Algerian" panose="04020705040A02060702" pitchFamily="82" charset="0"/>
+              </a:rPr>
+              <a:t>ExecutedTests</a:t>
+            </a:r>
+            <a:r>
+              <a:rPr lang="en-US" dirty="0">
+                <a:latin typeface="Algerian" panose="04020705040A02060702" pitchFamily="82" charset="0"/>
+              </a:rPr>
+              <a:t>, Problems</a:t>
+            </a:r>
+          </a:p>
+          <a:p>
+            <a:r>
+              <a:rPr lang="en-US" dirty="0">
+                <a:solidFill>
+                  <a:srgbClr val="FF0000"/>
+                </a:solidFill>
+                <a:latin typeface="Algerian" panose="04020705040A02060702" pitchFamily="82" charset="0"/>
+              </a:rPr>
+              <a:t>WHERE</a:t>
+            </a:r>
+            <a:r>
+              <a:rPr lang="en-US" dirty="0">
+                <a:latin typeface="Algerian" panose="04020705040A02060702" pitchFamily="82" charset="0"/>
+              </a:rPr>
+              <a:t> </a:t>
+            </a:r>
+            <a:r>
+              <a:rPr lang="en-US" dirty="0" err="1">
+                <a:latin typeface="Algerian" panose="04020705040A02060702" pitchFamily="82" charset="0"/>
+              </a:rPr>
+              <a:t>Tests.Id</a:t>
+            </a:r>
+            <a:r>
+              <a:rPr lang="en-US" dirty="0">
+                <a:latin typeface="Algerian" panose="04020705040A02060702" pitchFamily="82" charset="0"/>
+              </a:rPr>
+              <a:t> = </a:t>
+            </a:r>
+            <a:r>
+              <a:rPr lang="en-US" dirty="0" err="1">
+                <a:latin typeface="Algerian" panose="04020705040A02060702" pitchFamily="82" charset="0"/>
+              </a:rPr>
+              <a:t>ExecutedTests.TestId</a:t>
+            </a:r>
+            <a:r>
+              <a:rPr lang="en-US" dirty="0">
+                <a:latin typeface="Algerian" panose="04020705040A02060702" pitchFamily="82" charset="0"/>
+              </a:rPr>
+              <a:t> </a:t>
+            </a:r>
+            <a:r>
+              <a:rPr lang="en-US" dirty="0">
+                <a:solidFill>
+                  <a:srgbClr val="FF0000"/>
+                </a:solidFill>
+                <a:latin typeface="Algerian" panose="04020705040A02060702" pitchFamily="82" charset="0"/>
+              </a:rPr>
+              <a:t>AND</a:t>
+            </a:r>
+            <a:r>
+              <a:rPr lang="en-US" dirty="0">
+                <a:latin typeface="Algerian" panose="04020705040A02060702" pitchFamily="82" charset="0"/>
+              </a:rPr>
+              <a:t> </a:t>
+            </a:r>
+            <a:r>
+              <a:rPr lang="en-US" dirty="0" err="1">
+                <a:latin typeface="Algerian" panose="04020705040A02060702" pitchFamily="82" charset="0"/>
+              </a:rPr>
+              <a:t>Tests.ProblemId</a:t>
+            </a:r>
+            <a:r>
+              <a:rPr lang="en-US" dirty="0">
+                <a:latin typeface="Algerian" panose="04020705040A02060702" pitchFamily="82" charset="0"/>
+              </a:rPr>
+              <a:t> = </a:t>
+            </a:r>
+            <a:r>
+              <a:rPr lang="en-US" dirty="0" err="1">
+                <a:latin typeface="Algerian" panose="04020705040A02060702" pitchFamily="82" charset="0"/>
+              </a:rPr>
+              <a:t>Problems.Id</a:t>
+            </a:r>
+            <a:r>
+              <a:rPr lang="en-US" dirty="0">
+                <a:latin typeface="Algerian" panose="04020705040A02060702" pitchFamily="82" charset="0"/>
+              </a:rPr>
+              <a:t> </a:t>
+            </a:r>
+            <a:r>
+              <a:rPr lang="en-US" dirty="0">
+                <a:solidFill>
+                  <a:srgbClr val="FF0000"/>
+                </a:solidFill>
+                <a:latin typeface="Algerian" panose="04020705040A02060702" pitchFamily="82" charset="0"/>
+              </a:rPr>
+              <a:t>AND</a:t>
+            </a:r>
+            <a:r>
+              <a:rPr lang="en-US" dirty="0">
+                <a:latin typeface="Algerian" panose="04020705040A02060702" pitchFamily="82" charset="0"/>
+              </a:rPr>
+              <a:t> </a:t>
+            </a:r>
+            <a:r>
+              <a:rPr lang="en-US" dirty="0" err="1">
+                <a:latin typeface="Algerian" panose="04020705040A02060702" pitchFamily="82" charset="0"/>
+              </a:rPr>
+              <a:t>Problems.Id</a:t>
+            </a:r>
+            <a:r>
+              <a:rPr lang="en-US" dirty="0">
+                <a:latin typeface="Algerian" panose="04020705040A02060702" pitchFamily="82" charset="0"/>
+              </a:rPr>
+              <a:t> = </a:t>
+            </a:r>
+            <a:r>
+              <a:rPr lang="en-US" dirty="0">
+                <a:solidFill>
+                  <a:srgbClr val="0070C0"/>
+                </a:solidFill>
+                <a:latin typeface="Algerian" panose="04020705040A02060702" pitchFamily="82" charset="0"/>
+              </a:rPr>
+              <a:t>1</a:t>
+            </a:r>
+          </a:p>
+        </p:txBody>
+      </p:sp>
+    </p:spTree>
+    <p:extLst>
+      <p:ext uri="{BB962C8B-B14F-4D97-AF65-F5344CB8AC3E}">
+        <p14:creationId xmlns:p14="http://schemas.microsoft.com/office/powerpoint/2010/main" val="3640873684"/>
+      </p:ext>
+    </p:extLst>
+  </p:cSld>
+  <p:clrMapOvr>
+    <a:masterClrMapping/>
+  </p:clrMapOvr>
+</p:sld>
+</file>
+
+<file path=ppt/slides/slide9.xml><?xml version="1.0" encoding="utf-8"?>
+<p:sld xmlns:a="http://schemas.openxmlformats.org/drawingml/2006/main" xmlns:r="http://schemas.openxmlformats.org/officeDocument/2006/relationships" xmlns:p="http://schemas.openxmlformats.org/presentationml/2006/main">
+  <p:cSld>
+    <p:spTree>
+      <p:nvGrpSpPr>
+        <p:cNvPr id="1" name=""/>
+        <p:cNvGrpSpPr/>
+        <p:nvPr/>
+      </p:nvGrpSpPr>
+      <p:grpSpPr>
+        <a:xfrm>
+          <a:off x="0" y="0"/>
+          <a:ext cx="0" cy="0"/>
+          <a:chOff x="0" y="0"/>
+          <a:chExt cx="0" cy="0"/>
+        </a:xfrm>
+      </p:grpSpPr>
+      <p:sp>
+        <p:nvSpPr>
+          <p:cNvPr id="2" name="Title 1">
+            <a:extLst>
+              <a:ext uri="{FF2B5EF4-FFF2-40B4-BE49-F238E27FC236}">
+                <a16:creationId xmlns:a16="http://schemas.microsoft.com/office/drawing/2014/main" id="{79EF2D8F-08FF-2470-629E-1ECBFC695342}"/>
+              </a:ext>
+            </a:extLst>
+          </p:cNvPr>
+          <p:cNvSpPr>
+            <a:spLocks noGrp="1"/>
+          </p:cNvSpPr>
+          <p:nvPr>
+            <p:ph type="title"/>
+          </p:nvPr>
+        </p:nvSpPr>
+        <p:spPr/>
+        <p:txBody>
+          <a:bodyPr/>
+          <a:lstStyle/>
+          <a:p>
+            <a:r>
+              <a:rPr lang="en-US" b="1" i="1" dirty="0" err="1">
+                <a:cs typeface="Calibri Light"/>
+              </a:rPr>
+              <a:t>Подзаявки</a:t>
+            </a:r>
+            <a:endParaRPr lang="en-US" b="1" i="1" dirty="0" err="1"/>
+          </a:p>
+        </p:txBody>
+      </p:sp>
+      <p:sp>
+        <p:nvSpPr>
+          <p:cNvPr id="4" name="Текстово поле 3">
+            <a:extLst>
+              <a:ext uri="{FF2B5EF4-FFF2-40B4-BE49-F238E27FC236}">
+                <a16:creationId xmlns:a16="http://schemas.microsoft.com/office/drawing/2014/main" id="{77185441-23CF-86C8-F0DA-2C050EE6156F}"/>
+              </a:ext>
+            </a:extLst>
+          </p:cNvPr>
+          <p:cNvSpPr txBox="1"/>
+          <p:nvPr/>
+        </p:nvSpPr>
+        <p:spPr>
+          <a:xfrm>
+            <a:off x="343948" y="2305615"/>
+            <a:ext cx="12407317" cy="2246769"/>
+          </a:xfrm>
+          <a:prstGeom prst="rect">
+            <a:avLst/>
+          </a:prstGeom>
+          <a:noFill/>
+        </p:spPr>
+        <p:txBody>
+          <a:bodyPr wrap="square" rtlCol="0">
+            <a:spAutoFit/>
+          </a:bodyPr>
+          <a:lstStyle/>
+          <a:p>
+            <a:r>
+              <a:rPr lang="en-US" sz="2000" dirty="0">
+                <a:solidFill>
+                  <a:srgbClr val="FF0000"/>
+                </a:solidFill>
+                <a:latin typeface="Algerian" panose="04020705040A02060702" pitchFamily="82" charset="0"/>
+              </a:rPr>
+              <a:t>SELECT</a:t>
+            </a:r>
+            <a:r>
+              <a:rPr lang="en-US" sz="2000" dirty="0">
+                <a:latin typeface="Algerian" panose="04020705040A02060702" pitchFamily="82" charset="0"/>
+              </a:rPr>
+              <a:t> </a:t>
+            </a:r>
+            <a:r>
+              <a:rPr lang="en-US" sz="2000" dirty="0" err="1">
+                <a:latin typeface="Algerian" panose="04020705040A02060702" pitchFamily="82" charset="0"/>
+              </a:rPr>
+              <a:t>max_s.ProblemId</a:t>
+            </a:r>
+            <a:r>
+              <a:rPr lang="en-US" sz="2000" dirty="0">
+                <a:latin typeface="Algerian" panose="04020705040A02060702" pitchFamily="82" charset="0"/>
+              </a:rPr>
+              <a:t>, </a:t>
+            </a:r>
+            <a:r>
+              <a:rPr lang="en-US" sz="2000" dirty="0" err="1">
+                <a:latin typeface="Algerian" panose="04020705040A02060702" pitchFamily="82" charset="0"/>
+              </a:rPr>
+              <a:t>Submissions.Id</a:t>
+            </a:r>
+            <a:r>
+              <a:rPr lang="en-US" sz="2000" dirty="0">
+                <a:latin typeface="Algerian" panose="04020705040A02060702" pitchFamily="82" charset="0"/>
+              </a:rPr>
+              <a:t>, </a:t>
+            </a:r>
+            <a:r>
+              <a:rPr lang="en-US" sz="2000" dirty="0" err="1">
+                <a:latin typeface="Algerian" panose="04020705040A02060702" pitchFamily="82" charset="0"/>
+              </a:rPr>
+              <a:t>max_s</a:t>
+            </a:r>
+            <a:r>
+              <a:rPr lang="en-US" sz="2000" dirty="0">
+                <a:latin typeface="Algerian" panose="04020705040A02060702" pitchFamily="82" charset="0"/>
+              </a:rPr>
+              <a:t>.</a:t>
+            </a:r>
+            <a:r>
+              <a:rPr lang="en-US" sz="2000" dirty="0">
+                <a:solidFill>
+                  <a:schemeClr val="accent4"/>
+                </a:solidFill>
+                <a:latin typeface="Algerian" panose="04020705040A02060702" pitchFamily="82" charset="0"/>
+              </a:rPr>
+              <a:t>[</a:t>
+            </a:r>
+            <a:r>
+              <a:rPr lang="en-US" sz="2000" dirty="0">
+                <a:latin typeface="Algerian" panose="04020705040A02060702" pitchFamily="82" charset="0"/>
+              </a:rPr>
+              <a:t>Max Points</a:t>
+            </a:r>
+            <a:r>
+              <a:rPr lang="en-US" sz="2000" dirty="0">
+                <a:solidFill>
+                  <a:schemeClr val="accent4"/>
+                </a:solidFill>
+                <a:latin typeface="Algerian" panose="04020705040A02060702" pitchFamily="82" charset="0"/>
+              </a:rPr>
+              <a:t>]</a:t>
+            </a:r>
+            <a:r>
+              <a:rPr lang="en-US" sz="2000" dirty="0">
+                <a:latin typeface="Algerian" panose="04020705040A02060702" pitchFamily="82" charset="0"/>
+              </a:rPr>
+              <a:t> </a:t>
+            </a:r>
+          </a:p>
+          <a:p>
+            <a:r>
+              <a:rPr lang="en-US" sz="2000" dirty="0">
+                <a:solidFill>
+                  <a:srgbClr val="FF0000"/>
+                </a:solidFill>
+                <a:latin typeface="Algerian" panose="04020705040A02060702" pitchFamily="82" charset="0"/>
+              </a:rPr>
+              <a:t>FROM</a:t>
+            </a:r>
+            <a:r>
+              <a:rPr lang="en-US" sz="2000" dirty="0">
+                <a:latin typeface="Algerian" panose="04020705040A02060702" pitchFamily="82" charset="0"/>
+              </a:rPr>
+              <a:t> Submissions, </a:t>
+            </a:r>
+            <a:r>
+              <a:rPr lang="en-US" sz="2000" dirty="0">
+                <a:solidFill>
+                  <a:schemeClr val="accent4"/>
+                </a:solidFill>
+                <a:latin typeface="Algerian" panose="04020705040A02060702" pitchFamily="82" charset="0"/>
+              </a:rPr>
+              <a:t>(</a:t>
+            </a:r>
+          </a:p>
+          <a:p>
+            <a:r>
+              <a:rPr lang="en-US" sz="2000" dirty="0">
+                <a:latin typeface="Algerian" panose="04020705040A02060702" pitchFamily="82" charset="0"/>
+              </a:rPr>
+              <a:t>	</a:t>
+            </a:r>
+            <a:r>
+              <a:rPr lang="en-US" sz="2000" dirty="0">
+                <a:solidFill>
+                  <a:srgbClr val="FF0000"/>
+                </a:solidFill>
+                <a:latin typeface="Algerian" panose="04020705040A02060702" pitchFamily="82" charset="0"/>
+              </a:rPr>
+              <a:t>SELECT</a:t>
+            </a:r>
+            <a:r>
+              <a:rPr lang="en-US" sz="2000" dirty="0">
+                <a:latin typeface="Algerian" panose="04020705040A02060702" pitchFamily="82" charset="0"/>
+              </a:rPr>
+              <a:t> </a:t>
+            </a:r>
+            <a:r>
+              <a:rPr lang="en-US" sz="2000" dirty="0" err="1">
+                <a:latin typeface="Algerian" panose="04020705040A02060702" pitchFamily="82" charset="0"/>
+              </a:rPr>
+              <a:t>Submissions.ProblemId</a:t>
+            </a:r>
+            <a:r>
+              <a:rPr lang="en-US" sz="2000" dirty="0">
+                <a:latin typeface="Algerian" panose="04020705040A02060702" pitchFamily="82" charset="0"/>
+              </a:rPr>
+              <a:t>, </a:t>
+            </a:r>
+            <a:r>
+              <a:rPr lang="en-US" sz="2000" dirty="0">
+                <a:solidFill>
+                  <a:srgbClr val="0070C0"/>
+                </a:solidFill>
+                <a:latin typeface="Algerian" panose="04020705040A02060702" pitchFamily="82" charset="0"/>
+              </a:rPr>
+              <a:t>MAX</a:t>
+            </a:r>
+            <a:r>
+              <a:rPr lang="en-US" sz="2000" dirty="0">
+                <a:latin typeface="Algerian" panose="04020705040A02060702" pitchFamily="82" charset="0"/>
+              </a:rPr>
+              <a:t>(</a:t>
+            </a:r>
+            <a:r>
+              <a:rPr lang="en-US" sz="2000" dirty="0" err="1">
+                <a:latin typeface="Algerian" panose="04020705040A02060702" pitchFamily="82" charset="0"/>
+              </a:rPr>
+              <a:t>Submissions.ActualPoints</a:t>
+            </a:r>
+            <a:r>
+              <a:rPr lang="en-US" sz="2000" dirty="0">
+                <a:latin typeface="Algerian" panose="04020705040A02060702" pitchFamily="82" charset="0"/>
+              </a:rPr>
+              <a:t>) </a:t>
+            </a:r>
+            <a:r>
+              <a:rPr lang="en-US" sz="2000" dirty="0">
+                <a:solidFill>
+                  <a:srgbClr val="FF0000"/>
+                </a:solidFill>
+                <a:latin typeface="Algerian" panose="04020705040A02060702" pitchFamily="82" charset="0"/>
+              </a:rPr>
+              <a:t>AS</a:t>
+            </a:r>
+            <a:r>
+              <a:rPr lang="en-US" sz="2000" dirty="0">
+                <a:latin typeface="Algerian" panose="04020705040A02060702" pitchFamily="82" charset="0"/>
+              </a:rPr>
+              <a:t> </a:t>
+            </a:r>
+            <a:r>
+              <a:rPr lang="en-US" sz="2000" dirty="0">
+                <a:solidFill>
+                  <a:schemeClr val="accent4"/>
+                </a:solidFill>
+                <a:latin typeface="Algerian" panose="04020705040A02060702" pitchFamily="82" charset="0"/>
+              </a:rPr>
+              <a:t>[</a:t>
+            </a:r>
+            <a:r>
+              <a:rPr lang="en-US" sz="2000" dirty="0">
+                <a:latin typeface="Algerian" panose="04020705040A02060702" pitchFamily="82" charset="0"/>
+              </a:rPr>
+              <a:t>Max Points</a:t>
+            </a:r>
+            <a:r>
+              <a:rPr lang="en-US" sz="2000" dirty="0">
+                <a:solidFill>
+                  <a:schemeClr val="accent4"/>
+                </a:solidFill>
+                <a:latin typeface="Algerian" panose="04020705040A02060702" pitchFamily="82" charset="0"/>
+              </a:rPr>
+              <a:t>]</a:t>
+            </a:r>
+          </a:p>
+          <a:p>
+            <a:r>
+              <a:rPr lang="en-US" sz="2000" dirty="0">
+                <a:latin typeface="Algerian" panose="04020705040A02060702" pitchFamily="82" charset="0"/>
+              </a:rPr>
+              <a:t>	</a:t>
+            </a:r>
+            <a:r>
+              <a:rPr lang="en-US" sz="2000" dirty="0">
+                <a:solidFill>
+                  <a:srgbClr val="FF0000"/>
+                </a:solidFill>
+                <a:latin typeface="Algerian" panose="04020705040A02060702" pitchFamily="82" charset="0"/>
+              </a:rPr>
+              <a:t>FROM</a:t>
+            </a:r>
+            <a:r>
+              <a:rPr lang="en-US" sz="2000" dirty="0">
+                <a:latin typeface="Algerian" panose="04020705040A02060702" pitchFamily="82" charset="0"/>
+              </a:rPr>
+              <a:t> Submissions</a:t>
+            </a:r>
+          </a:p>
+          <a:p>
+            <a:r>
+              <a:rPr lang="en-US" sz="2000" dirty="0">
+                <a:latin typeface="Algerian" panose="04020705040A02060702" pitchFamily="82" charset="0"/>
+              </a:rPr>
+              <a:t>	</a:t>
+            </a:r>
+            <a:r>
+              <a:rPr lang="en-US" sz="2000" dirty="0">
+                <a:solidFill>
+                  <a:srgbClr val="FF0000"/>
+                </a:solidFill>
+                <a:latin typeface="Algerian" panose="04020705040A02060702" pitchFamily="82" charset="0"/>
+              </a:rPr>
+              <a:t>GROUP BY </a:t>
+            </a:r>
+            <a:r>
+              <a:rPr lang="en-US" sz="2000" dirty="0" err="1">
+                <a:latin typeface="Algerian" panose="04020705040A02060702" pitchFamily="82" charset="0"/>
+              </a:rPr>
+              <a:t>Submissions.ProblemId</a:t>
+            </a:r>
+            <a:r>
+              <a:rPr lang="en-US" sz="2000" dirty="0">
+                <a:solidFill>
+                  <a:schemeClr val="accent4"/>
+                </a:solidFill>
+                <a:latin typeface="Algerian" panose="04020705040A02060702" pitchFamily="82" charset="0"/>
+              </a:rPr>
+              <a:t>)</a:t>
+            </a:r>
+            <a:r>
+              <a:rPr lang="en-US" sz="2000" dirty="0">
+                <a:latin typeface="Algerian" panose="04020705040A02060702" pitchFamily="82" charset="0"/>
+              </a:rPr>
+              <a:t> </a:t>
+            </a:r>
+            <a:r>
+              <a:rPr lang="en-US" sz="2000" dirty="0">
+                <a:solidFill>
+                  <a:srgbClr val="FF0000"/>
+                </a:solidFill>
+                <a:latin typeface="Algerian" panose="04020705040A02060702" pitchFamily="82" charset="0"/>
+              </a:rPr>
+              <a:t>AS</a:t>
+            </a:r>
+            <a:r>
+              <a:rPr lang="en-US" sz="2000" dirty="0">
+                <a:latin typeface="Algerian" panose="04020705040A02060702" pitchFamily="82" charset="0"/>
+              </a:rPr>
+              <a:t> </a:t>
+            </a:r>
+            <a:r>
+              <a:rPr lang="en-US" sz="2000" dirty="0" err="1">
+                <a:latin typeface="Algerian" panose="04020705040A02060702" pitchFamily="82" charset="0"/>
+              </a:rPr>
+              <a:t>max_s</a:t>
+            </a:r>
+            <a:endParaRPr lang="en-US" sz="2000" dirty="0">
+              <a:latin typeface="Algerian" panose="04020705040A02060702" pitchFamily="82" charset="0"/>
+            </a:endParaRPr>
+          </a:p>
+          <a:p>
+            <a:r>
+              <a:rPr lang="en-US" sz="2000" dirty="0">
+                <a:solidFill>
+                  <a:srgbClr val="FF0000"/>
+                </a:solidFill>
+                <a:latin typeface="Algerian" panose="04020705040A02060702" pitchFamily="82" charset="0"/>
+              </a:rPr>
+              <a:t>WHERE</a:t>
+            </a:r>
+            <a:r>
+              <a:rPr lang="en-US" sz="2000" dirty="0">
+                <a:latin typeface="Algerian" panose="04020705040A02060702" pitchFamily="82" charset="0"/>
+              </a:rPr>
+              <a:t> </a:t>
+            </a:r>
+            <a:r>
+              <a:rPr lang="en-US" sz="2000" dirty="0" err="1">
+                <a:latin typeface="Algerian" panose="04020705040A02060702" pitchFamily="82" charset="0"/>
+              </a:rPr>
+              <a:t>Submissions.ProblemId</a:t>
+            </a:r>
+            <a:r>
+              <a:rPr lang="en-US" sz="2000" dirty="0">
+                <a:latin typeface="Algerian" panose="04020705040A02060702" pitchFamily="82" charset="0"/>
+              </a:rPr>
+              <a:t> </a:t>
+            </a:r>
+            <a:r>
+              <a:rPr lang="en-US" sz="2000" dirty="0">
+                <a:solidFill>
+                  <a:srgbClr val="FF0000"/>
+                </a:solidFill>
+                <a:latin typeface="Algerian" panose="04020705040A02060702" pitchFamily="82" charset="0"/>
+              </a:rPr>
+              <a:t>=</a:t>
+            </a:r>
+            <a:r>
+              <a:rPr lang="en-US" sz="2000" dirty="0">
+                <a:latin typeface="Algerian" panose="04020705040A02060702" pitchFamily="82" charset="0"/>
+              </a:rPr>
+              <a:t> </a:t>
+            </a:r>
+            <a:r>
+              <a:rPr lang="en-US" sz="2000" dirty="0" err="1">
+                <a:latin typeface="Algerian" panose="04020705040A02060702" pitchFamily="82" charset="0"/>
+              </a:rPr>
+              <a:t>max_s.ProblemId</a:t>
+            </a:r>
+            <a:r>
+              <a:rPr lang="en-US" sz="2000" dirty="0">
+                <a:latin typeface="Algerian" panose="04020705040A02060702" pitchFamily="82" charset="0"/>
+              </a:rPr>
+              <a:t> </a:t>
+            </a:r>
+          </a:p>
+          <a:p>
+            <a:r>
+              <a:rPr lang="en-US" sz="2000" dirty="0">
+                <a:solidFill>
+                  <a:srgbClr val="FF0000"/>
+                </a:solidFill>
+                <a:latin typeface="Algerian" panose="04020705040A02060702" pitchFamily="82" charset="0"/>
+              </a:rPr>
+              <a:t>AND</a:t>
+            </a:r>
+            <a:r>
+              <a:rPr lang="en-US" sz="2000" dirty="0">
+                <a:latin typeface="Algerian" panose="04020705040A02060702" pitchFamily="82" charset="0"/>
+              </a:rPr>
+              <a:t> </a:t>
+            </a:r>
+            <a:r>
+              <a:rPr lang="en-US" sz="2000" dirty="0" err="1">
+                <a:latin typeface="Algerian" panose="04020705040A02060702" pitchFamily="82" charset="0"/>
+              </a:rPr>
+              <a:t>Submissions.ActualPoints</a:t>
+            </a:r>
+            <a:r>
+              <a:rPr lang="en-US" sz="2000" dirty="0">
+                <a:latin typeface="Algerian" panose="04020705040A02060702" pitchFamily="82" charset="0"/>
+              </a:rPr>
+              <a:t> = </a:t>
+            </a:r>
+            <a:r>
+              <a:rPr lang="en-US" sz="2000" dirty="0" err="1">
+                <a:latin typeface="Algerian" panose="04020705040A02060702" pitchFamily="82" charset="0"/>
+              </a:rPr>
+              <a:t>max_s</a:t>
+            </a:r>
+            <a:r>
+              <a:rPr lang="en-US" sz="2000" dirty="0">
+                <a:latin typeface="Algerian" panose="04020705040A02060702" pitchFamily="82" charset="0"/>
+              </a:rPr>
+              <a:t>.</a:t>
+            </a:r>
+            <a:r>
+              <a:rPr lang="en-US" sz="2000" dirty="0">
+                <a:solidFill>
+                  <a:schemeClr val="accent4"/>
+                </a:solidFill>
+                <a:latin typeface="Algerian" panose="04020705040A02060702" pitchFamily="82" charset="0"/>
+              </a:rPr>
+              <a:t>[</a:t>
+            </a:r>
+            <a:r>
+              <a:rPr lang="en-US" sz="2000" dirty="0">
+                <a:latin typeface="Algerian" panose="04020705040A02060702" pitchFamily="82" charset="0"/>
+              </a:rPr>
+              <a:t>Max Points</a:t>
+            </a:r>
+            <a:r>
+              <a:rPr lang="en-US" sz="2000" dirty="0">
+                <a:solidFill>
+                  <a:schemeClr val="accent4"/>
+                </a:solidFill>
+                <a:latin typeface="Algerian" panose="04020705040A02060702" pitchFamily="82" charset="0"/>
+              </a:rPr>
+              <a:t>]</a:t>
+            </a:r>
+            <a:r>
+              <a:rPr lang="en-US" sz="2000" dirty="0">
+                <a:latin typeface="Algerian" panose="04020705040A02060702" pitchFamily="82" charset="0"/>
+              </a:rPr>
+              <a:t>;</a:t>
+            </a:r>
+          </a:p>
+        </p:txBody>
+      </p:sp>
+    </p:spTree>
+    <p:extLst>
+      <p:ext uri="{BB962C8B-B14F-4D97-AF65-F5344CB8AC3E}">
+        <p14:creationId xmlns:p14="http://schemas.microsoft.com/office/powerpoint/2010/main" val="3605120774"/>
       </p:ext>
     </p:extLst>
   </p:cSld>

</xml_diff>